<commit_message>
CA3 - Poster - Complete
</commit_message>
<xml_diff>
--- a/CA3-Poster.pptx
+++ b/CA3-Poster.pptx
@@ -277,7 +277,7 @@
             <a:fld id="{0158C5BC-9A70-462C-B28D-9600239EAC64}" type="datetimeFigureOut">
               <a:rPr lang="en-US" smtClean="0"/>
               <a:pPr/>
-              <a:t>5/21/2025</a:t>
+              <a:t>5/22/2025</a:t>
             </a:fld>
             <a:endParaRPr lang="en-US"/>
           </a:p>
@@ -444,7 +444,7 @@
             <a:fld id="{E6CC2317-6751-4CD4-9995-8782DD78E936}" type="datetimeFigureOut">
               <a:rPr lang="en-US" smtClean="0"/>
               <a:pPr/>
-              <a:t>5/21/2025</a:t>
+              <a:t>5/22/2025</a:t>
             </a:fld>
             <a:endParaRPr lang="en-US" dirty="0"/>
           </a:p>
@@ -14305,100 +14305,6 @@
       </p:sp>
       <p:sp>
         <p:nvSpPr>
-          <p:cNvPr id="8" name="Text Placeholder 7"/>
-          <p:cNvSpPr>
-            <a:spLocks noGrp="1"/>
-          </p:cNvSpPr>
-          <p:nvPr>
-            <p:ph type="body" sz="quarter" idx="24"/>
-          </p:nvPr>
-        </p:nvSpPr>
-        <p:spPr/>
-        <p:txBody>
-          <a:bodyPr/>
-          <a:lstStyle/>
-          <a:p>
-            <a:r>
-              <a:rPr lang="en-US" dirty="0">
-                <a:solidFill>
-                  <a:schemeClr val="tx2"/>
-                </a:solidFill>
-                <a:latin typeface="Arial" panose="020B0604020202020204" pitchFamily="34" charset="0"/>
-                <a:cs typeface="Arial" panose="020B0604020202020204" pitchFamily="34" charset="0"/>
-              </a:rPr>
-              <a:t>Dataset</a:t>
-            </a:r>
-          </a:p>
-        </p:txBody>
-      </p:sp>
-      <p:sp>
-        <p:nvSpPr>
-          <p:cNvPr id="9" name="Text Placeholder 8"/>
-          <p:cNvSpPr>
-            <a:spLocks noGrp="1"/>
-          </p:cNvSpPr>
-          <p:nvPr>
-            <p:ph type="body" sz="quarter" idx="25"/>
-          </p:nvPr>
-        </p:nvSpPr>
-        <p:spPr>
-          <a:xfrm>
-            <a:off x="33346443" y="21931197"/>
-            <a:ext cx="10047018" cy="677100"/>
-          </a:xfrm>
-        </p:spPr>
-        <p:txBody>
-          <a:bodyPr/>
-          <a:lstStyle/>
-          <a:p>
-            <a:r>
-              <a:rPr lang="en-US" sz="3200" dirty="0">
-                <a:solidFill>
-                  <a:schemeClr val="tx2"/>
-                </a:solidFill>
-                <a:latin typeface="Arial" panose="020B0604020202020204" pitchFamily="34" charset="0"/>
-                <a:cs typeface="Arial" panose="020B0604020202020204" pitchFamily="34" charset="0"/>
-              </a:rPr>
-              <a:t>CONCLUSIONS</a:t>
-            </a:r>
-          </a:p>
-        </p:txBody>
-      </p:sp>
-      <p:sp>
-        <p:nvSpPr>
-          <p:cNvPr id="11" name="Text Placeholder 10"/>
-          <p:cNvSpPr>
-            <a:spLocks noGrp="1"/>
-          </p:cNvSpPr>
-          <p:nvPr>
-            <p:ph type="body" sz="quarter" idx="27"/>
-          </p:nvPr>
-        </p:nvSpPr>
-        <p:spPr>
-          <a:xfrm>
-            <a:off x="33392567" y="28504101"/>
-            <a:ext cx="10047018" cy="754045"/>
-          </a:xfrm>
-        </p:spPr>
-        <p:txBody>
-          <a:bodyPr/>
-          <a:lstStyle/>
-          <a:p>
-            <a:r>
-              <a:rPr lang="en-US" dirty="0">
-                <a:solidFill>
-                  <a:schemeClr val="tx2"/>
-                </a:solidFill>
-                <a:latin typeface="Arial" panose="020B0604020202020204" pitchFamily="34" charset="0"/>
-                <a:cs typeface="Arial" panose="020B0604020202020204" pitchFamily="34" charset="0"/>
-              </a:rPr>
-              <a:t>REFERENCES</a:t>
-            </a:r>
-          </a:p>
-        </p:txBody>
-      </p:sp>
-      <p:sp>
-        <p:nvSpPr>
           <p:cNvPr id="16" name="Text Placeholder 15"/>
           <p:cNvSpPr>
             <a:spLocks noGrp="1"/>
@@ -14465,102 +14371,6 @@
                 <a:cs typeface="Arial" panose="020B0604020202020204" pitchFamily="34" charset="0"/>
               </a:rPr>
               <a:t>A Machine Learning Approach to Forecast Dublin Home Rent</a:t>
-            </a:r>
-          </a:p>
-        </p:txBody>
-      </p:sp>
-      <p:sp>
-        <p:nvSpPr>
-          <p:cNvPr id="28" name="Text Placeholder 6"/>
-          <p:cNvSpPr>
-            <a:spLocks noGrp="1"/>
-          </p:cNvSpPr>
-          <p:nvPr>
-            <p:ph type="body" sz="quarter" idx="23"/>
-          </p:nvPr>
-        </p:nvSpPr>
-        <p:spPr>
-          <a:xfrm>
-            <a:off x="22415504" y="6392907"/>
-            <a:ext cx="10048874" cy="2031303"/>
-          </a:xfrm>
-        </p:spPr>
-        <p:txBody>
-          <a:bodyPr/>
-          <a:lstStyle/>
-          <a:p>
-            <a:r>
-              <a:rPr lang="en-US" sz="3600" dirty="0">
-                <a:solidFill>
-                  <a:schemeClr val="tx1"/>
-                </a:solidFill>
-                <a:latin typeface="+mj-lt"/>
-                <a:cs typeface="Arial" panose="020B0604020202020204" pitchFamily="34" charset="0"/>
-              </a:rPr>
-              <a:t>Downloadable from </a:t>
-            </a:r>
-            <a:r>
-              <a:rPr lang="en-IE" sz="3600" dirty="0">
-                <a:solidFill>
-                  <a:schemeClr val="tx1"/>
-                </a:solidFill>
-                <a:latin typeface="+mj-lt"/>
-                <a:cs typeface="Arial" panose="020B0604020202020204" pitchFamily="34" charset="0"/>
-                <a:hlinkClick r:id="rId3">
-                  <a:extLst>
-                    <a:ext uri="{A12FA001-AC4F-418D-AE19-62706E023703}">
-                      <ahyp:hlinkClr xmlns:ahyp="http://schemas.microsoft.com/office/drawing/2018/hyperlinkcolor" val="tx"/>
-                    </a:ext>
-                  </a:extLst>
-                </a:hlinkClick>
-              </a:rPr>
-              <a:t>https://data.cso.ie/table/RIQ02</a:t>
-            </a:r>
-            <a:endParaRPr lang="en-IE" sz="3600" dirty="0">
-              <a:solidFill>
-                <a:schemeClr val="tx1"/>
-              </a:solidFill>
-              <a:latin typeface="+mj-lt"/>
-              <a:cs typeface="Arial" panose="020B0604020202020204" pitchFamily="34" charset="0"/>
-            </a:endParaRPr>
-          </a:p>
-          <a:p>
-            <a:endParaRPr lang="en-US" i="1" u="sng" dirty="0">
-              <a:latin typeface="Arial" panose="020B0604020202020204" pitchFamily="34" charset="0"/>
-              <a:cs typeface="Arial" panose="020B0604020202020204" pitchFamily="34" charset="0"/>
-            </a:endParaRPr>
-          </a:p>
-        </p:txBody>
-      </p:sp>
-      <p:sp>
-        <p:nvSpPr>
-          <p:cNvPr id="30" name="Text Placeholder 6"/>
-          <p:cNvSpPr>
-            <a:spLocks noGrp="1"/>
-          </p:cNvSpPr>
-          <p:nvPr>
-            <p:ph type="body" sz="quarter" idx="23"/>
-          </p:nvPr>
-        </p:nvSpPr>
-        <p:spPr>
-          <a:xfrm>
-            <a:off x="33371596" y="5536712"/>
-            <a:ext cx="10048874" cy="846363"/>
-          </a:xfrm>
-        </p:spPr>
-        <p:txBody>
-          <a:bodyPr/>
-          <a:lstStyle/>
-          <a:p>
-            <a:r>
-              <a:rPr lang="en-US" i="1" u="sng" dirty="0">
-                <a:solidFill>
-                  <a:schemeClr val="tx2"/>
-                </a:solidFill>
-                <a:latin typeface="Arial" panose="020B0604020202020204" pitchFamily="34" charset="0"/>
-                <a:cs typeface="Arial" panose="020B0604020202020204" pitchFamily="34" charset="0"/>
-              </a:rPr>
-              <a:t>Self Efficacy</a:t>
             </a:r>
           </a:p>
         </p:txBody>
@@ -15262,7 +15072,7 @@
           <p:nvPr/>
         </p:nvPicPr>
         <p:blipFill>
-          <a:blip r:embed="rId4"/>
+          <a:blip r:embed="rId3"/>
           <a:stretch>
             <a:fillRect/>
           </a:stretch>
@@ -15653,10 +15463,10 @@
       </p:sp>
       <p:pic>
         <p:nvPicPr>
-          <p:cNvPr id="24" name="Picture 23" descr="A screenshot of a diagram&#10;&#10;AI-generated content may be incorrect.">
+          <p:cNvPr id="5" name="Picture 4">
             <a:extLst>
               <a:ext uri="{FF2B5EF4-FFF2-40B4-BE49-F238E27FC236}">
-                <a16:creationId xmlns:a16="http://schemas.microsoft.com/office/drawing/2014/main" id="{9C432586-4720-4139-B416-470ACA4868BC}"/>
+                <a16:creationId xmlns:a16="http://schemas.microsoft.com/office/drawing/2014/main" id="{D1C52670-03ED-57A2-A777-1435E5248F1F}"/>
               </a:ext>
             </a:extLst>
           </p:cNvPr>
@@ -15666,15 +15476,15 @@
           <p:nvPr/>
         </p:nvPicPr>
         <p:blipFill>
-          <a:blip r:embed="rId5"/>
+          <a:blip r:embed="rId4"/>
           <a:stretch>
             <a:fillRect/>
           </a:stretch>
         </p:blipFill>
         <p:spPr>
           <a:xfrm>
-            <a:off x="11645173" y="27134476"/>
-            <a:ext cx="9711200" cy="4966420"/>
+            <a:off x="11593947" y="29258146"/>
+            <a:ext cx="9736942" cy="2555628"/>
           </a:xfrm>
           <a:prstGeom prst="rect">
             <a:avLst/>
@@ -15683,10 +15493,10 @@
       </p:pic>
       <p:sp>
         <p:nvSpPr>
-          <p:cNvPr id="26" name="Text Placeholder 4">
+          <p:cNvPr id="10" name="Text Placeholder 7">
             <a:extLst>
               <a:ext uri="{FF2B5EF4-FFF2-40B4-BE49-F238E27FC236}">
-                <a16:creationId xmlns:a16="http://schemas.microsoft.com/office/drawing/2014/main" id="{3D8E7E4E-8061-87E3-716A-A5A2874E3ABA}"/>
+                <a16:creationId xmlns:a16="http://schemas.microsoft.com/office/drawing/2014/main" id="{C4401896-09CC-B1CE-9091-A088124500E9}"/>
               </a:ext>
             </a:extLst>
           </p:cNvPr>
@@ -15697,8 +15507,189 @@
         </p:nvSpPr>
         <p:spPr>
           <a:xfrm>
-            <a:off x="11561454" y="22823005"/>
-            <a:ext cx="10048874" cy="4450427"/>
+            <a:off x="11272489" y="22944779"/>
+            <a:ext cx="10058400" cy="800211"/>
+          </a:xfrm>
+          <a:prstGeom prst="rect">
+            <a:avLst/>
+          </a:prstGeom>
+          <a:noFill/>
+        </p:spPr>
+        <p:txBody>
+          <a:bodyPr lIns="91436" tIns="91436" rIns="91436" bIns="91436" anchor="ctr" anchorCtr="0">
+            <a:spAutoFit/>
+          </a:bodyPr>
+          <a:lstStyle>
+            <a:lvl1pPr marL="0" indent="0" algn="ctr" defTabSz="4388900" rtl="0" eaLnBrk="1" latinLnBrk="0" hangingPunct="1">
+              <a:spcBef>
+                <a:spcPct val="20000"/>
+              </a:spcBef>
+              <a:buFont typeface="Arial" pitchFamily="34" charset="0"/>
+              <a:buNone/>
+              <a:defRPr sz="3700" b="1" u="sng" kern="1200" baseline="0">
+                <a:solidFill>
+                  <a:schemeClr val="accent5">
+                    <a:lumMod val="50000"/>
+                  </a:schemeClr>
+                </a:solidFill>
+                <a:latin typeface="+mn-lt"/>
+                <a:ea typeface="+mn-ea"/>
+                <a:cs typeface="+mn-cs"/>
+              </a:defRPr>
+            </a:lvl1pPr>
+            <a:lvl2pPr marL="3565982" indent="-1371531" algn="l" defTabSz="4388900" rtl="0" eaLnBrk="1" latinLnBrk="0" hangingPunct="1">
+              <a:spcBef>
+                <a:spcPct val="20000"/>
+              </a:spcBef>
+              <a:buFont typeface="Arial" pitchFamily="34" charset="0"/>
+              <a:buChar char="–"/>
+              <a:defRPr sz="13500" kern="1200">
+                <a:solidFill>
+                  <a:schemeClr val="tx1"/>
+                </a:solidFill>
+                <a:latin typeface="+mn-lt"/>
+                <a:ea typeface="+mn-ea"/>
+                <a:cs typeface="+mn-cs"/>
+              </a:defRPr>
+            </a:lvl2pPr>
+            <a:lvl3pPr marL="5486126" indent="-1097226" algn="l" defTabSz="4388900" rtl="0" eaLnBrk="1" latinLnBrk="0" hangingPunct="1">
+              <a:spcBef>
+                <a:spcPct val="20000"/>
+              </a:spcBef>
+              <a:buFont typeface="Arial" pitchFamily="34" charset="0"/>
+              <a:buChar char="•"/>
+              <a:defRPr sz="11600" kern="1200">
+                <a:solidFill>
+                  <a:schemeClr val="tx1"/>
+                </a:solidFill>
+                <a:latin typeface="+mn-lt"/>
+                <a:ea typeface="+mn-ea"/>
+                <a:cs typeface="+mn-cs"/>
+              </a:defRPr>
+            </a:lvl3pPr>
+            <a:lvl4pPr marL="7680577" indent="-1097226" algn="l" defTabSz="4388900" rtl="0" eaLnBrk="1" latinLnBrk="0" hangingPunct="1">
+              <a:spcBef>
+                <a:spcPct val="20000"/>
+              </a:spcBef>
+              <a:buFont typeface="Arial" pitchFamily="34" charset="0"/>
+              <a:buChar char="–"/>
+              <a:defRPr sz="9600" kern="1200">
+                <a:solidFill>
+                  <a:schemeClr val="tx1"/>
+                </a:solidFill>
+                <a:latin typeface="+mn-lt"/>
+                <a:ea typeface="+mn-ea"/>
+                <a:cs typeface="+mn-cs"/>
+              </a:defRPr>
+            </a:lvl4pPr>
+            <a:lvl5pPr marL="9875026" indent="-1097226" algn="l" defTabSz="4388900" rtl="0" eaLnBrk="1" latinLnBrk="0" hangingPunct="1">
+              <a:spcBef>
+                <a:spcPct val="20000"/>
+              </a:spcBef>
+              <a:buFont typeface="Arial" pitchFamily="34" charset="0"/>
+              <a:buChar char="»"/>
+              <a:defRPr sz="9600" kern="1200">
+                <a:solidFill>
+                  <a:schemeClr val="tx1"/>
+                </a:solidFill>
+                <a:latin typeface="+mn-lt"/>
+                <a:ea typeface="+mn-ea"/>
+                <a:cs typeface="+mn-cs"/>
+              </a:defRPr>
+            </a:lvl5pPr>
+            <a:lvl6pPr marL="12069477" indent="-1097226" algn="l" defTabSz="4388900" rtl="0" eaLnBrk="1" latinLnBrk="0" hangingPunct="1">
+              <a:spcBef>
+                <a:spcPct val="20000"/>
+              </a:spcBef>
+              <a:buFont typeface="Arial" pitchFamily="34" charset="0"/>
+              <a:buChar char="•"/>
+              <a:defRPr sz="9600" kern="1200">
+                <a:solidFill>
+                  <a:schemeClr val="tx1"/>
+                </a:solidFill>
+                <a:latin typeface="+mn-lt"/>
+                <a:ea typeface="+mn-ea"/>
+                <a:cs typeface="+mn-cs"/>
+              </a:defRPr>
+            </a:lvl6pPr>
+            <a:lvl7pPr marL="14263926" indent="-1097226" algn="l" defTabSz="4388900" rtl="0" eaLnBrk="1" latinLnBrk="0" hangingPunct="1">
+              <a:spcBef>
+                <a:spcPct val="20000"/>
+              </a:spcBef>
+              <a:buFont typeface="Arial" pitchFamily="34" charset="0"/>
+              <a:buChar char="•"/>
+              <a:defRPr sz="9600" kern="1200">
+                <a:solidFill>
+                  <a:schemeClr val="tx1"/>
+                </a:solidFill>
+                <a:latin typeface="+mn-lt"/>
+                <a:ea typeface="+mn-ea"/>
+                <a:cs typeface="+mn-cs"/>
+              </a:defRPr>
+            </a:lvl7pPr>
+            <a:lvl8pPr marL="16458377" indent="-1097226" algn="l" defTabSz="4388900" rtl="0" eaLnBrk="1" latinLnBrk="0" hangingPunct="1">
+              <a:spcBef>
+                <a:spcPct val="20000"/>
+              </a:spcBef>
+              <a:buFont typeface="Arial" pitchFamily="34" charset="0"/>
+              <a:buChar char="•"/>
+              <a:defRPr sz="9600" kern="1200">
+                <a:solidFill>
+                  <a:schemeClr val="tx1"/>
+                </a:solidFill>
+                <a:latin typeface="+mn-lt"/>
+                <a:ea typeface="+mn-ea"/>
+                <a:cs typeface="+mn-cs"/>
+              </a:defRPr>
+            </a:lvl8pPr>
+            <a:lvl9pPr marL="18652827" indent="-1097226" algn="l" defTabSz="4388900" rtl="0" eaLnBrk="1" latinLnBrk="0" hangingPunct="1">
+              <a:spcBef>
+                <a:spcPct val="20000"/>
+              </a:spcBef>
+              <a:buFont typeface="Arial" pitchFamily="34" charset="0"/>
+              <a:buChar char="•"/>
+              <a:defRPr sz="9600" kern="1200">
+                <a:solidFill>
+                  <a:schemeClr val="tx1"/>
+                </a:solidFill>
+                <a:latin typeface="+mn-lt"/>
+                <a:ea typeface="+mn-ea"/>
+                <a:cs typeface="+mn-cs"/>
+              </a:defRPr>
+            </a:lvl9pPr>
+          </a:lstStyle>
+          <a:p>
+            <a:r>
+              <a:rPr lang="en-US" sz="4000" dirty="0">
+                <a:solidFill>
+                  <a:schemeClr val="tx2"/>
+                </a:solidFill>
+                <a:latin typeface="Arial" panose="020B0604020202020204" pitchFamily="34" charset="0"/>
+                <a:cs typeface="Arial" panose="020B0604020202020204" pitchFamily="34" charset="0"/>
+              </a:rPr>
+              <a:t>Dataset</a:t>
+            </a:r>
+          </a:p>
+        </p:txBody>
+      </p:sp>
+      <p:sp>
+        <p:nvSpPr>
+          <p:cNvPr id="12" name="Text Placeholder 6">
+            <a:extLst>
+              <a:ext uri="{FF2B5EF4-FFF2-40B4-BE49-F238E27FC236}">
+                <a16:creationId xmlns:a16="http://schemas.microsoft.com/office/drawing/2014/main" id="{3B85F637-C9A7-AC6A-0DF4-D863A7318443}"/>
+              </a:ext>
+            </a:extLst>
+          </p:cNvPr>
+          <p:cNvSpPr txBox="1">
+            <a:spLocks/>
+          </p:cNvSpPr>
+          <p:nvPr/>
+        </p:nvSpPr>
+        <p:spPr>
+          <a:xfrm>
+            <a:off x="11500719" y="23565502"/>
+            <a:ext cx="10048874" cy="1569638"/>
           </a:xfrm>
           <a:prstGeom prst="rect">
             <a:avLst/>
@@ -15849,17 +15840,15 @@
           </a:lstStyle>
           <a:p>
             <a:r>
-              <a:rPr lang="en-IE" sz="3600" dirty="0">
+              <a:rPr lang="en-US" sz="3600" dirty="0">
                 <a:solidFill>
                   <a:schemeClr val="tx1"/>
                 </a:solidFill>
                 <a:latin typeface="+mj-lt"/>
                 <a:cs typeface="Arial" panose="020B0604020202020204" pitchFamily="34" charset="0"/>
               </a:rPr>
-              <a:t>This is a process model that serves as the base for a data science process and includes Business understanding, Data understanding, Data preparation, Modelling, Evaluation and Deployment. </a:t>
+              <a:t>Downloadable from </a:t>
             </a:r>
-          </a:p>
-          <a:p>
             <a:r>
               <a:rPr lang="en-IE" sz="3600" dirty="0">
                 <a:solidFill>
@@ -15867,10 +15856,17 @@
                 </a:solidFill>
                 <a:latin typeface="+mj-lt"/>
                 <a:cs typeface="Arial" panose="020B0604020202020204" pitchFamily="34" charset="0"/>
+                <a:hlinkClick r:id="rId5">
+                  <a:extLst>
+                    <a:ext uri="{A12FA001-AC4F-418D-AE19-62706E023703}">
+                      <ahyp:hlinkClr xmlns:ahyp="http://schemas.microsoft.com/office/drawing/2018/hyperlinkcolor" val="tx"/>
+                    </a:ext>
+                  </a:extLst>
+                </a:hlinkClick>
               </a:rPr>
-              <a:t>A detailed analysis of the data has been done to find the feature important columns as shown.</a:t>
+              <a:t>https://data.cso.ie/table/RIQ02</a:t>
             </a:r>
-            <a:endParaRPr lang="en-US" sz="3600" dirty="0">
+            <a:endParaRPr lang="en-IE" sz="3600" dirty="0">
               <a:solidFill>
                 <a:schemeClr val="tx1"/>
               </a:solidFill>
@@ -15882,10 +15878,10 @@
       </p:sp>
       <p:sp>
         <p:nvSpPr>
-          <p:cNvPr id="33" name="Text Placeholder 4">
+          <p:cNvPr id="13" name="Text Placeholder 4">
             <a:extLst>
               <a:ext uri="{FF2B5EF4-FFF2-40B4-BE49-F238E27FC236}">
-                <a16:creationId xmlns:a16="http://schemas.microsoft.com/office/drawing/2014/main" id="{B42424BA-E4FC-C544-D2F9-A0DB9D268F9E}"/>
+                <a16:creationId xmlns:a16="http://schemas.microsoft.com/office/drawing/2014/main" id="{51905E8C-94C9-00ED-B8DC-518B68D6D9EF}"/>
               </a:ext>
             </a:extLst>
           </p:cNvPr>
@@ -15896,8 +15892,8 @@
         </p:nvSpPr>
         <p:spPr>
           <a:xfrm>
-            <a:off x="22549498" y="8028377"/>
-            <a:ext cx="9857512" cy="8993209"/>
+            <a:off x="11460162" y="24890023"/>
+            <a:ext cx="9711200" cy="4118028"/>
           </a:xfrm>
           <a:prstGeom prst="rect">
             <a:avLst/>
@@ -16055,7 +16051,7 @@
                 <a:latin typeface="+mj-lt"/>
                 <a:cs typeface="Arial" panose="020B0604020202020204" pitchFamily="34" charset="0"/>
               </a:rPr>
-              <a:t>Below are the columns in the datasheet</a:t>
+              <a:t>1.Quarter – Time period indicating the data time</a:t>
             </a:r>
           </a:p>
           <a:p>
@@ -16067,7 +16063,7 @@
                 <a:latin typeface="+mj-lt"/>
                 <a:cs typeface="Arial" panose="020B0604020202020204" pitchFamily="34" charset="0"/>
               </a:rPr>
-              <a:t>1.STATISTIC Label – Description of the dataset</a:t>
+              <a:t>2.Number of Bedrooms –One, two and three bed.</a:t>
             </a:r>
           </a:p>
           <a:p>
@@ -16079,7 +16075,7 @@
                 <a:latin typeface="+mj-lt"/>
                 <a:cs typeface="Arial" panose="020B0604020202020204" pitchFamily="34" charset="0"/>
               </a:rPr>
-              <a:t>2.Quarter – Time period indicating the data time</a:t>
+              <a:t>3.Property type –Semi-detached, Terrace &amp; Apartment</a:t>
             </a:r>
           </a:p>
           <a:p>
@@ -16091,65 +16087,205 @@
                 <a:latin typeface="+mj-lt"/>
                 <a:cs typeface="Arial" panose="020B0604020202020204" pitchFamily="34" charset="0"/>
               </a:rPr>
-              <a:t>3.Number of Bedrooms – Indicate the number of bedrooms in the house. It has 3 values namely – One bed, two bed and three bed.</a:t>
+              <a:t>4.Value – Numerical value indicating the rent amount.</a:t>
             </a:r>
           </a:p>
+        </p:txBody>
+      </p:sp>
+      <p:sp>
+        <p:nvSpPr>
+          <p:cNvPr id="21" name="Text Placeholder 7">
+            <a:extLst>
+              <a:ext uri="{FF2B5EF4-FFF2-40B4-BE49-F238E27FC236}">
+                <a16:creationId xmlns:a16="http://schemas.microsoft.com/office/drawing/2014/main" id="{EF0786E6-B523-503E-3766-EFAD5E319A43}"/>
+              </a:ext>
+            </a:extLst>
+          </p:cNvPr>
+          <p:cNvSpPr txBox="1">
+            <a:spLocks/>
+          </p:cNvSpPr>
+          <p:nvPr/>
+        </p:nvSpPr>
+        <p:spPr>
+          <a:xfrm>
+            <a:off x="22377404" y="5525666"/>
+            <a:ext cx="10058400" cy="800211"/>
+          </a:xfrm>
+          <a:prstGeom prst="rect">
+            <a:avLst/>
+          </a:prstGeom>
+          <a:noFill/>
+        </p:spPr>
+        <p:txBody>
+          <a:bodyPr lIns="91436" tIns="91436" rIns="91436" bIns="91436" anchor="ctr" anchorCtr="0">
+            <a:spAutoFit/>
+          </a:bodyPr>
+          <a:lstStyle>
+            <a:lvl1pPr marL="0" indent="0" algn="ctr" defTabSz="4388900" rtl="0" eaLnBrk="1" latinLnBrk="0" hangingPunct="1">
+              <a:spcBef>
+                <a:spcPct val="20000"/>
+              </a:spcBef>
+              <a:buFont typeface="Arial" pitchFamily="34" charset="0"/>
+              <a:buNone/>
+              <a:defRPr sz="3700" b="1" u="sng" kern="1200" baseline="0">
+                <a:solidFill>
+                  <a:schemeClr val="accent5">
+                    <a:lumMod val="50000"/>
+                  </a:schemeClr>
+                </a:solidFill>
+                <a:latin typeface="+mn-lt"/>
+                <a:ea typeface="+mn-ea"/>
+                <a:cs typeface="+mn-cs"/>
+              </a:defRPr>
+            </a:lvl1pPr>
+            <a:lvl2pPr marL="3565982" indent="-1371531" algn="l" defTabSz="4388900" rtl="0" eaLnBrk="1" latinLnBrk="0" hangingPunct="1">
+              <a:spcBef>
+                <a:spcPct val="20000"/>
+              </a:spcBef>
+              <a:buFont typeface="Arial" pitchFamily="34" charset="0"/>
+              <a:buChar char="–"/>
+              <a:defRPr sz="13500" kern="1200">
+                <a:solidFill>
+                  <a:schemeClr val="tx1"/>
+                </a:solidFill>
+                <a:latin typeface="+mn-lt"/>
+                <a:ea typeface="+mn-ea"/>
+                <a:cs typeface="+mn-cs"/>
+              </a:defRPr>
+            </a:lvl2pPr>
+            <a:lvl3pPr marL="5486126" indent="-1097226" algn="l" defTabSz="4388900" rtl="0" eaLnBrk="1" latinLnBrk="0" hangingPunct="1">
+              <a:spcBef>
+                <a:spcPct val="20000"/>
+              </a:spcBef>
+              <a:buFont typeface="Arial" pitchFamily="34" charset="0"/>
+              <a:buChar char="•"/>
+              <a:defRPr sz="11600" kern="1200">
+                <a:solidFill>
+                  <a:schemeClr val="tx1"/>
+                </a:solidFill>
+                <a:latin typeface="+mn-lt"/>
+                <a:ea typeface="+mn-ea"/>
+                <a:cs typeface="+mn-cs"/>
+              </a:defRPr>
+            </a:lvl3pPr>
+            <a:lvl4pPr marL="7680577" indent="-1097226" algn="l" defTabSz="4388900" rtl="0" eaLnBrk="1" latinLnBrk="0" hangingPunct="1">
+              <a:spcBef>
+                <a:spcPct val="20000"/>
+              </a:spcBef>
+              <a:buFont typeface="Arial" pitchFamily="34" charset="0"/>
+              <a:buChar char="–"/>
+              <a:defRPr sz="9600" kern="1200">
+                <a:solidFill>
+                  <a:schemeClr val="tx1"/>
+                </a:solidFill>
+                <a:latin typeface="+mn-lt"/>
+                <a:ea typeface="+mn-ea"/>
+                <a:cs typeface="+mn-cs"/>
+              </a:defRPr>
+            </a:lvl4pPr>
+            <a:lvl5pPr marL="9875026" indent="-1097226" algn="l" defTabSz="4388900" rtl="0" eaLnBrk="1" latinLnBrk="0" hangingPunct="1">
+              <a:spcBef>
+                <a:spcPct val="20000"/>
+              </a:spcBef>
+              <a:buFont typeface="Arial" pitchFamily="34" charset="0"/>
+              <a:buChar char="»"/>
+              <a:defRPr sz="9600" kern="1200">
+                <a:solidFill>
+                  <a:schemeClr val="tx1"/>
+                </a:solidFill>
+                <a:latin typeface="+mn-lt"/>
+                <a:ea typeface="+mn-ea"/>
+                <a:cs typeface="+mn-cs"/>
+              </a:defRPr>
+            </a:lvl5pPr>
+            <a:lvl6pPr marL="12069477" indent="-1097226" algn="l" defTabSz="4388900" rtl="0" eaLnBrk="1" latinLnBrk="0" hangingPunct="1">
+              <a:spcBef>
+                <a:spcPct val="20000"/>
+              </a:spcBef>
+              <a:buFont typeface="Arial" pitchFamily="34" charset="0"/>
+              <a:buChar char="•"/>
+              <a:defRPr sz="9600" kern="1200">
+                <a:solidFill>
+                  <a:schemeClr val="tx1"/>
+                </a:solidFill>
+                <a:latin typeface="+mn-lt"/>
+                <a:ea typeface="+mn-ea"/>
+                <a:cs typeface="+mn-cs"/>
+              </a:defRPr>
+            </a:lvl6pPr>
+            <a:lvl7pPr marL="14263926" indent="-1097226" algn="l" defTabSz="4388900" rtl="0" eaLnBrk="1" latinLnBrk="0" hangingPunct="1">
+              <a:spcBef>
+                <a:spcPct val="20000"/>
+              </a:spcBef>
+              <a:buFont typeface="Arial" pitchFamily="34" charset="0"/>
+              <a:buChar char="•"/>
+              <a:defRPr sz="9600" kern="1200">
+                <a:solidFill>
+                  <a:schemeClr val="tx1"/>
+                </a:solidFill>
+                <a:latin typeface="+mn-lt"/>
+                <a:ea typeface="+mn-ea"/>
+                <a:cs typeface="+mn-cs"/>
+              </a:defRPr>
+            </a:lvl7pPr>
+            <a:lvl8pPr marL="16458377" indent="-1097226" algn="l" defTabSz="4388900" rtl="0" eaLnBrk="1" latinLnBrk="0" hangingPunct="1">
+              <a:spcBef>
+                <a:spcPct val="20000"/>
+              </a:spcBef>
+              <a:buFont typeface="Arial" pitchFamily="34" charset="0"/>
+              <a:buChar char="•"/>
+              <a:defRPr sz="9600" kern="1200">
+                <a:solidFill>
+                  <a:schemeClr val="tx1"/>
+                </a:solidFill>
+                <a:latin typeface="+mn-lt"/>
+                <a:ea typeface="+mn-ea"/>
+                <a:cs typeface="+mn-cs"/>
+              </a:defRPr>
+            </a:lvl8pPr>
+            <a:lvl9pPr marL="18652827" indent="-1097226" algn="l" defTabSz="4388900" rtl="0" eaLnBrk="1" latinLnBrk="0" hangingPunct="1">
+              <a:spcBef>
+                <a:spcPct val="20000"/>
+              </a:spcBef>
+              <a:buFont typeface="Arial" pitchFamily="34" charset="0"/>
+              <a:buChar char="•"/>
+              <a:defRPr sz="9600" kern="1200">
+                <a:solidFill>
+                  <a:schemeClr val="tx1"/>
+                </a:solidFill>
+                <a:latin typeface="+mn-lt"/>
+                <a:ea typeface="+mn-ea"/>
+                <a:cs typeface="+mn-cs"/>
+              </a:defRPr>
+            </a:lvl9pPr>
+          </a:lstStyle>
           <a:p>
             <a:r>
-              <a:rPr lang="en-GB" sz="3600" dirty="0">
-                <a:solidFill>
-                  <a:schemeClr val="tx1"/>
-                </a:solidFill>
-                <a:latin typeface="+mj-lt"/>
+              <a:rPr lang="en-US" sz="4000">
+                <a:solidFill>
+                  <a:schemeClr val="tx2"/>
+                </a:solidFill>
+                <a:latin typeface="Arial" panose="020B0604020202020204" pitchFamily="34" charset="0"/>
                 <a:cs typeface="Arial" panose="020B0604020202020204" pitchFamily="34" charset="0"/>
               </a:rPr>
-              <a:t>4.Property type – 3 possible values namely, semi-detached house, Terrace house and Apartment</a:t>
+              <a:t>Initial Analysis</a:t>
             </a:r>
-          </a:p>
-          <a:p>
-            <a:r>
-              <a:rPr lang="en-GB" sz="3600" dirty="0">
-                <a:solidFill>
-                  <a:schemeClr val="tx1"/>
-                </a:solidFill>
-                <a:latin typeface="+mj-lt"/>
-                <a:cs typeface="Arial" panose="020B0604020202020204" pitchFamily="34" charset="0"/>
-              </a:rPr>
-              <a:t>5.Location – In this dataset, this will contain only ‘Dublin’</a:t>
-            </a:r>
-          </a:p>
-          <a:p>
-            <a:r>
-              <a:rPr lang="en-GB" sz="3600" dirty="0">
-                <a:solidFill>
-                  <a:schemeClr val="tx1"/>
-                </a:solidFill>
-                <a:latin typeface="+mj-lt"/>
-                <a:cs typeface="Arial" panose="020B0604020202020204" pitchFamily="34" charset="0"/>
-              </a:rPr>
-              <a:t>6.Unit – Indicates the currency and this will contain only ‘Euro’</a:t>
-            </a:r>
-          </a:p>
-          <a:p>
-            <a:r>
-              <a:rPr lang="en-GB" sz="3600" dirty="0">
-                <a:solidFill>
-                  <a:schemeClr val="tx1"/>
-                </a:solidFill>
-                <a:latin typeface="+mj-lt"/>
-                <a:cs typeface="Arial" panose="020B0604020202020204" pitchFamily="34" charset="0"/>
-              </a:rPr>
-              <a:t>7.Value – Numerical value indicating the rent amount.</a:t>
-            </a:r>
+            <a:endParaRPr lang="en-US" sz="4000" dirty="0">
+              <a:solidFill>
+                <a:schemeClr val="tx2"/>
+              </a:solidFill>
+              <a:latin typeface="Arial" panose="020B0604020202020204" pitchFamily="34" charset="0"/>
+              <a:cs typeface="Arial" panose="020B0604020202020204" pitchFamily="34" charset="0"/>
+            </a:endParaRPr>
           </a:p>
         </p:txBody>
       </p:sp>
       <p:pic>
         <p:nvPicPr>
-          <p:cNvPr id="52" name="Picture 51">
+          <p:cNvPr id="22" name="Picture 21" descr="A screenshot of a diagram&#10;&#10;AI-generated content may be incorrect.">
             <a:extLst>
               <a:ext uri="{FF2B5EF4-FFF2-40B4-BE49-F238E27FC236}">
-                <a16:creationId xmlns:a16="http://schemas.microsoft.com/office/drawing/2014/main" id="{40046A51-728E-B550-A253-9B9978E14E0C}"/>
+                <a16:creationId xmlns:a16="http://schemas.microsoft.com/office/drawing/2014/main" id="{68D9C051-CD84-7484-9C87-DE6F0AEF6145}"/>
               </a:ext>
             </a:extLst>
           </p:cNvPr>
@@ -16166,8 +16302,8 @@
         </p:blipFill>
         <p:spPr>
           <a:xfrm>
-            <a:off x="22602480" y="17132655"/>
-            <a:ext cx="9736942" cy="2555628"/>
+            <a:off x="22584341" y="8602329"/>
+            <a:ext cx="9711200" cy="4966420"/>
           </a:xfrm>
           <a:prstGeom prst="rect">
             <a:avLst/>
@@ -16176,10 +16312,10 @@
       </p:pic>
       <p:sp>
         <p:nvSpPr>
-          <p:cNvPr id="53" name="Text Placeholder 7">
+          <p:cNvPr id="27" name="Text Placeholder 4">
             <a:extLst>
               <a:ext uri="{FF2B5EF4-FFF2-40B4-BE49-F238E27FC236}">
-                <a16:creationId xmlns:a16="http://schemas.microsoft.com/office/drawing/2014/main" id="{90FDE840-9610-AC78-E8C2-883C4BBF542B}"/>
+                <a16:creationId xmlns:a16="http://schemas.microsoft.com/office/drawing/2014/main" id="{E0A41ED5-3BCD-09C8-2938-9EC04542CF79}"/>
               </a:ext>
             </a:extLst>
           </p:cNvPr>
@@ -16190,8 +16326,235 @@
         </p:nvSpPr>
         <p:spPr>
           <a:xfrm>
-            <a:off x="22506295" y="20229669"/>
-            <a:ext cx="9736942" cy="754045"/>
+            <a:off x="22506295" y="20453445"/>
+            <a:ext cx="10048874" cy="3231632"/>
+          </a:xfrm>
+          <a:prstGeom prst="rect">
+            <a:avLst/>
+          </a:prstGeom>
+        </p:spPr>
+        <p:txBody>
+          <a:bodyPr wrap="square" lIns="228589" tIns="228589" rIns="228589" bIns="228589">
+            <a:spAutoFit/>
+          </a:bodyPr>
+          <a:lstStyle>
+            <a:lvl1pPr marL="0" indent="0" algn="l" defTabSz="4388900" rtl="0" eaLnBrk="1" latinLnBrk="0" hangingPunct="1">
+              <a:spcBef>
+                <a:spcPct val="20000"/>
+              </a:spcBef>
+              <a:buFont typeface="Arial" pitchFamily="34" charset="0"/>
+              <a:buNone/>
+              <a:defRPr sz="2500" kern="1200">
+                <a:solidFill>
+                  <a:schemeClr val="accent5">
+                    <a:lumMod val="50000"/>
+                  </a:schemeClr>
+                </a:solidFill>
+                <a:latin typeface="Times New Roman" pitchFamily="18" charset="0"/>
+                <a:ea typeface="+mn-ea"/>
+                <a:cs typeface="Times New Roman" pitchFamily="18" charset="0"/>
+              </a:defRPr>
+            </a:lvl1pPr>
+            <a:lvl2pPr marL="1485825" indent="-571471" algn="l" defTabSz="4388900" rtl="0" eaLnBrk="1" latinLnBrk="0" hangingPunct="1">
+              <a:spcBef>
+                <a:spcPct val="20000"/>
+              </a:spcBef>
+              <a:buFont typeface="Arial" pitchFamily="34" charset="0"/>
+              <a:buChar char="–"/>
+              <a:defRPr sz="2500" kern="1200">
+                <a:solidFill>
+                  <a:schemeClr val="tx1"/>
+                </a:solidFill>
+                <a:latin typeface="Trebuchet MS" pitchFamily="34" charset="0"/>
+                <a:ea typeface="+mn-ea"/>
+                <a:cs typeface="+mn-cs"/>
+              </a:defRPr>
+            </a:lvl2pPr>
+            <a:lvl3pPr marL="2057297" indent="-571471" algn="l" defTabSz="4388900" rtl="0" eaLnBrk="1" latinLnBrk="0" hangingPunct="1">
+              <a:spcBef>
+                <a:spcPct val="20000"/>
+              </a:spcBef>
+              <a:buFont typeface="Arial" pitchFamily="34" charset="0"/>
+              <a:buChar char="•"/>
+              <a:defRPr sz="2500" kern="1200">
+                <a:solidFill>
+                  <a:schemeClr val="tx1"/>
+                </a:solidFill>
+                <a:latin typeface="Trebuchet MS" pitchFamily="34" charset="0"/>
+                <a:ea typeface="+mn-ea"/>
+                <a:cs typeface="+mn-cs"/>
+              </a:defRPr>
+            </a:lvl3pPr>
+            <a:lvl4pPr marL="2685916" indent="-628619" algn="l" defTabSz="4388900" rtl="0" eaLnBrk="1" latinLnBrk="0" hangingPunct="1">
+              <a:spcBef>
+                <a:spcPct val="20000"/>
+              </a:spcBef>
+              <a:buFont typeface="Arial" pitchFamily="34" charset="0"/>
+              <a:buChar char="–"/>
+              <a:defRPr sz="2500" kern="1200">
+                <a:solidFill>
+                  <a:schemeClr val="tx1"/>
+                </a:solidFill>
+                <a:latin typeface="Trebuchet MS" pitchFamily="34" charset="0"/>
+                <a:ea typeface="+mn-ea"/>
+                <a:cs typeface="+mn-cs"/>
+              </a:defRPr>
+            </a:lvl4pPr>
+            <a:lvl5pPr marL="3143093" indent="-457177" algn="l" defTabSz="4388900" rtl="0" eaLnBrk="1" latinLnBrk="0" hangingPunct="1">
+              <a:spcBef>
+                <a:spcPct val="20000"/>
+              </a:spcBef>
+              <a:buFont typeface="Arial" pitchFamily="34" charset="0"/>
+              <a:buChar char="»"/>
+              <a:defRPr sz="2500" kern="1200">
+                <a:solidFill>
+                  <a:schemeClr val="tx1"/>
+                </a:solidFill>
+                <a:latin typeface="Trebuchet MS" pitchFamily="34" charset="0"/>
+                <a:ea typeface="+mn-ea"/>
+                <a:cs typeface="+mn-cs"/>
+              </a:defRPr>
+            </a:lvl5pPr>
+            <a:lvl6pPr marL="12069477" indent="-1097226" algn="l" defTabSz="4388900" rtl="0" eaLnBrk="1" latinLnBrk="0" hangingPunct="1">
+              <a:spcBef>
+                <a:spcPct val="20000"/>
+              </a:spcBef>
+              <a:buFont typeface="Arial" pitchFamily="34" charset="0"/>
+              <a:buChar char="•"/>
+              <a:defRPr sz="9600" kern="1200">
+                <a:solidFill>
+                  <a:schemeClr val="tx1"/>
+                </a:solidFill>
+                <a:latin typeface="+mn-lt"/>
+                <a:ea typeface="+mn-ea"/>
+                <a:cs typeface="+mn-cs"/>
+              </a:defRPr>
+            </a:lvl6pPr>
+            <a:lvl7pPr marL="14263926" indent="-1097226" algn="l" defTabSz="4388900" rtl="0" eaLnBrk="1" latinLnBrk="0" hangingPunct="1">
+              <a:spcBef>
+                <a:spcPct val="20000"/>
+              </a:spcBef>
+              <a:buFont typeface="Arial" pitchFamily="34" charset="0"/>
+              <a:buChar char="•"/>
+              <a:defRPr sz="9600" kern="1200">
+                <a:solidFill>
+                  <a:schemeClr val="tx1"/>
+                </a:solidFill>
+                <a:latin typeface="+mn-lt"/>
+                <a:ea typeface="+mn-ea"/>
+                <a:cs typeface="+mn-cs"/>
+              </a:defRPr>
+            </a:lvl7pPr>
+            <a:lvl8pPr marL="16458377" indent="-1097226" algn="l" defTabSz="4388900" rtl="0" eaLnBrk="1" latinLnBrk="0" hangingPunct="1">
+              <a:spcBef>
+                <a:spcPct val="20000"/>
+              </a:spcBef>
+              <a:buFont typeface="Arial" pitchFamily="34" charset="0"/>
+              <a:buChar char="•"/>
+              <a:defRPr sz="9600" kern="1200">
+                <a:solidFill>
+                  <a:schemeClr val="tx1"/>
+                </a:solidFill>
+                <a:latin typeface="+mn-lt"/>
+                <a:ea typeface="+mn-ea"/>
+                <a:cs typeface="+mn-cs"/>
+              </a:defRPr>
+            </a:lvl8pPr>
+            <a:lvl9pPr marL="18652827" indent="-1097226" algn="l" defTabSz="4388900" rtl="0" eaLnBrk="1" latinLnBrk="0" hangingPunct="1">
+              <a:spcBef>
+                <a:spcPct val="20000"/>
+              </a:spcBef>
+              <a:buFont typeface="Arial" pitchFamily="34" charset="0"/>
+              <a:buChar char="•"/>
+              <a:defRPr sz="9600" kern="1200">
+                <a:solidFill>
+                  <a:schemeClr val="tx1"/>
+                </a:solidFill>
+                <a:latin typeface="+mn-lt"/>
+                <a:ea typeface="+mn-ea"/>
+                <a:cs typeface="+mn-cs"/>
+              </a:defRPr>
+            </a:lvl9pPr>
+          </a:lstStyle>
+          <a:p>
+            <a:r>
+              <a:rPr lang="en-IE" sz="3600" dirty="0">
+                <a:solidFill>
+                  <a:schemeClr val="tx1"/>
+                </a:solidFill>
+                <a:latin typeface="+mj-lt"/>
+                <a:cs typeface="Arial" panose="020B0604020202020204" pitchFamily="34" charset="0"/>
+              </a:rPr>
+              <a:t>Using multiple data split percentage for training and testing (80-20, 75-25, 70-30) along with machine learning techniques like cross validation and grid search CV, </a:t>
+            </a:r>
+            <a:r>
+              <a:rPr lang="en-IE" sz="3600" b="1" dirty="0">
+                <a:solidFill>
+                  <a:schemeClr val="tx1"/>
+                </a:solidFill>
+                <a:latin typeface="+mj-lt"/>
+                <a:cs typeface="Arial" panose="020B0604020202020204" pitchFamily="34" charset="0"/>
+              </a:rPr>
+              <a:t>Random Forest Regression</a:t>
+            </a:r>
+            <a:r>
+              <a:rPr lang="en-IE" sz="3600" dirty="0">
+                <a:solidFill>
+                  <a:schemeClr val="tx1"/>
+                </a:solidFill>
+                <a:latin typeface="+mj-lt"/>
+                <a:cs typeface="Arial" panose="020B0604020202020204" pitchFamily="34" charset="0"/>
+              </a:rPr>
+              <a:t> and </a:t>
+            </a:r>
+            <a:r>
+              <a:rPr lang="en-IE" sz="3600" b="1" dirty="0">
+                <a:solidFill>
+                  <a:schemeClr val="tx1"/>
+                </a:solidFill>
+                <a:latin typeface="+mj-lt"/>
+                <a:cs typeface="Arial" panose="020B0604020202020204" pitchFamily="34" charset="0"/>
+              </a:rPr>
+              <a:t>Linear Regression</a:t>
+            </a:r>
+            <a:r>
+              <a:rPr lang="en-IE" sz="3600" dirty="0">
+                <a:solidFill>
+                  <a:schemeClr val="tx1"/>
+                </a:solidFill>
+                <a:latin typeface="+mj-lt"/>
+                <a:cs typeface="Arial" panose="020B0604020202020204" pitchFamily="34" charset="0"/>
+              </a:rPr>
+              <a:t> models were created.</a:t>
+            </a:r>
+            <a:endParaRPr lang="en-US" sz="3600" dirty="0">
+              <a:solidFill>
+                <a:schemeClr val="tx1"/>
+              </a:solidFill>
+              <a:latin typeface="+mj-lt"/>
+              <a:cs typeface="Arial" panose="020B0604020202020204" pitchFamily="34" charset="0"/>
+            </a:endParaRPr>
+          </a:p>
+        </p:txBody>
+      </p:sp>
+      <p:sp>
+        <p:nvSpPr>
+          <p:cNvPr id="29" name="Text Placeholder 7">
+            <a:extLst>
+              <a:ext uri="{FF2B5EF4-FFF2-40B4-BE49-F238E27FC236}">
+                <a16:creationId xmlns:a16="http://schemas.microsoft.com/office/drawing/2014/main" id="{648568CF-940E-0888-2091-0270E323CA49}"/>
+              </a:ext>
+            </a:extLst>
+          </p:cNvPr>
+          <p:cNvSpPr txBox="1">
+            <a:spLocks/>
+          </p:cNvSpPr>
+          <p:nvPr/>
+        </p:nvSpPr>
+        <p:spPr>
+          <a:xfrm>
+            <a:off x="22506295" y="19701615"/>
+            <a:ext cx="9736942" cy="800211"/>
           </a:xfrm>
           <a:prstGeom prst="rect">
             <a:avLst/>
@@ -16343,7 +16706,7 @@
           </a:lstStyle>
           <a:p>
             <a:r>
-              <a:rPr lang="en-US" dirty="0">
+              <a:rPr lang="en-US" sz="4000" dirty="0">
                 <a:solidFill>
                   <a:schemeClr val="tx2"/>
                 </a:solidFill>
@@ -16357,51 +16720,2665 @@
       </p:sp>
       <p:sp>
         <p:nvSpPr>
-          <p:cNvPr id="55" name="Text Placeholder 54">
+          <p:cNvPr id="31" name="Text Placeholder 9">
             <a:extLst>
               <a:ext uri="{FF2B5EF4-FFF2-40B4-BE49-F238E27FC236}">
-                <a16:creationId xmlns:a16="http://schemas.microsoft.com/office/drawing/2014/main" id="{D85DD7F8-BE77-9931-CDD1-5592DB08CEA6}"/>
+                <a16:creationId xmlns:a16="http://schemas.microsoft.com/office/drawing/2014/main" id="{99DA422B-B9DE-E09C-24BD-F5266F7F7690}"/>
               </a:ext>
             </a:extLst>
           </p:cNvPr>
-          <p:cNvSpPr>
-            <a:spLocks noGrp="1"/>
+          <p:cNvSpPr txBox="1">
+            <a:spLocks/>
           </p:cNvSpPr>
-          <p:nvPr>
-            <p:ph type="body" sz="quarter" idx="28"/>
-          </p:nvPr>
+          <p:nvPr/>
         </p:nvSpPr>
-        <p:spPr/>
+        <p:spPr>
+          <a:xfrm>
+            <a:off x="22779081" y="24696167"/>
+            <a:ext cx="10047018" cy="6576650"/>
+          </a:xfrm>
+          <a:prstGeom prst="rect">
+            <a:avLst/>
+          </a:prstGeom>
+        </p:spPr>
         <p:txBody>
-          <a:bodyPr/>
-          <a:lstStyle/>
+          <a:bodyPr wrap="square" lIns="228589" tIns="228589" rIns="228589" bIns="228589">
+            <a:spAutoFit/>
+          </a:bodyPr>
+          <a:lstStyle>
+            <a:lvl1pPr marL="0" indent="0" algn="l" defTabSz="4388900" rtl="0" eaLnBrk="1" latinLnBrk="0" hangingPunct="1">
+              <a:spcBef>
+                <a:spcPct val="20000"/>
+              </a:spcBef>
+              <a:buFont typeface="Arial" pitchFamily="34" charset="0"/>
+              <a:buNone/>
+              <a:defRPr sz="2500" kern="1200">
+                <a:solidFill>
+                  <a:schemeClr val="tx1"/>
+                </a:solidFill>
+                <a:latin typeface="Calibri" panose="020F0502020204030204" pitchFamily="34" charset="0"/>
+                <a:ea typeface="+mn-ea"/>
+                <a:cs typeface="Calibri" panose="020F0502020204030204" pitchFamily="34" charset="0"/>
+              </a:defRPr>
+            </a:lvl1pPr>
+            <a:lvl2pPr marL="1485825" indent="-571471" algn="l" defTabSz="4388900" rtl="0" eaLnBrk="1" latinLnBrk="0" hangingPunct="1">
+              <a:spcBef>
+                <a:spcPct val="20000"/>
+              </a:spcBef>
+              <a:buFont typeface="Arial" pitchFamily="34" charset="0"/>
+              <a:buChar char="–"/>
+              <a:defRPr sz="2500" kern="1200">
+                <a:solidFill>
+                  <a:schemeClr val="tx1"/>
+                </a:solidFill>
+                <a:latin typeface="Trebuchet MS" pitchFamily="34" charset="0"/>
+                <a:ea typeface="+mn-ea"/>
+                <a:cs typeface="+mn-cs"/>
+              </a:defRPr>
+            </a:lvl2pPr>
+            <a:lvl3pPr marL="2057297" indent="-571471" algn="l" defTabSz="4388900" rtl="0" eaLnBrk="1" latinLnBrk="0" hangingPunct="1">
+              <a:spcBef>
+                <a:spcPct val="20000"/>
+              </a:spcBef>
+              <a:buFont typeface="Arial" pitchFamily="34" charset="0"/>
+              <a:buChar char="•"/>
+              <a:defRPr sz="2500" kern="1200">
+                <a:solidFill>
+                  <a:schemeClr val="tx1"/>
+                </a:solidFill>
+                <a:latin typeface="Trebuchet MS" pitchFamily="34" charset="0"/>
+                <a:ea typeface="+mn-ea"/>
+                <a:cs typeface="+mn-cs"/>
+              </a:defRPr>
+            </a:lvl3pPr>
+            <a:lvl4pPr marL="2685916" indent="-628619" algn="l" defTabSz="4388900" rtl="0" eaLnBrk="1" latinLnBrk="0" hangingPunct="1">
+              <a:spcBef>
+                <a:spcPct val="20000"/>
+              </a:spcBef>
+              <a:buFont typeface="Arial" pitchFamily="34" charset="0"/>
+              <a:buChar char="–"/>
+              <a:defRPr sz="2500" kern="1200">
+                <a:solidFill>
+                  <a:schemeClr val="tx1"/>
+                </a:solidFill>
+                <a:latin typeface="Trebuchet MS" pitchFamily="34" charset="0"/>
+                <a:ea typeface="+mn-ea"/>
+                <a:cs typeface="+mn-cs"/>
+              </a:defRPr>
+            </a:lvl4pPr>
+            <a:lvl5pPr marL="3143093" indent="-457177" algn="l" defTabSz="4388900" rtl="0" eaLnBrk="1" latinLnBrk="0" hangingPunct="1">
+              <a:spcBef>
+                <a:spcPct val="20000"/>
+              </a:spcBef>
+              <a:buFont typeface="Arial" pitchFamily="34" charset="0"/>
+              <a:buChar char="»"/>
+              <a:defRPr sz="2500" kern="1200">
+                <a:solidFill>
+                  <a:schemeClr val="tx1"/>
+                </a:solidFill>
+                <a:latin typeface="Trebuchet MS" pitchFamily="34" charset="0"/>
+                <a:ea typeface="+mn-ea"/>
+                <a:cs typeface="+mn-cs"/>
+              </a:defRPr>
+            </a:lvl5pPr>
+            <a:lvl6pPr marL="12069477" indent="-1097226" algn="l" defTabSz="4388900" rtl="0" eaLnBrk="1" latinLnBrk="0" hangingPunct="1">
+              <a:spcBef>
+                <a:spcPct val="20000"/>
+              </a:spcBef>
+              <a:buFont typeface="Arial" pitchFamily="34" charset="0"/>
+              <a:buChar char="•"/>
+              <a:defRPr sz="9600" kern="1200">
+                <a:solidFill>
+                  <a:schemeClr val="tx1"/>
+                </a:solidFill>
+                <a:latin typeface="+mn-lt"/>
+                <a:ea typeface="+mn-ea"/>
+                <a:cs typeface="+mn-cs"/>
+              </a:defRPr>
+            </a:lvl6pPr>
+            <a:lvl7pPr marL="14263926" indent="-1097226" algn="l" defTabSz="4388900" rtl="0" eaLnBrk="1" latinLnBrk="0" hangingPunct="1">
+              <a:spcBef>
+                <a:spcPct val="20000"/>
+              </a:spcBef>
+              <a:buFont typeface="Arial" pitchFamily="34" charset="0"/>
+              <a:buChar char="•"/>
+              <a:defRPr sz="9600" kern="1200">
+                <a:solidFill>
+                  <a:schemeClr val="tx1"/>
+                </a:solidFill>
+                <a:latin typeface="+mn-lt"/>
+                <a:ea typeface="+mn-ea"/>
+                <a:cs typeface="+mn-cs"/>
+              </a:defRPr>
+            </a:lvl7pPr>
+            <a:lvl8pPr marL="16458377" indent="-1097226" algn="l" defTabSz="4388900" rtl="0" eaLnBrk="1" latinLnBrk="0" hangingPunct="1">
+              <a:spcBef>
+                <a:spcPct val="20000"/>
+              </a:spcBef>
+              <a:buFont typeface="Arial" pitchFamily="34" charset="0"/>
+              <a:buChar char="•"/>
+              <a:defRPr sz="9600" kern="1200">
+                <a:solidFill>
+                  <a:schemeClr val="tx1"/>
+                </a:solidFill>
+                <a:latin typeface="+mn-lt"/>
+                <a:ea typeface="+mn-ea"/>
+                <a:cs typeface="+mn-cs"/>
+              </a:defRPr>
+            </a:lvl8pPr>
+            <a:lvl9pPr marL="18652827" indent="-1097226" algn="l" defTabSz="4388900" rtl="0" eaLnBrk="1" latinLnBrk="0" hangingPunct="1">
+              <a:spcBef>
+                <a:spcPct val="20000"/>
+              </a:spcBef>
+              <a:buFont typeface="Arial" pitchFamily="34" charset="0"/>
+              <a:buChar char="•"/>
+              <a:defRPr sz="9600" kern="1200">
+                <a:solidFill>
+                  <a:schemeClr val="tx1"/>
+                </a:solidFill>
+                <a:latin typeface="+mn-lt"/>
+                <a:ea typeface="+mn-ea"/>
+                <a:cs typeface="+mn-cs"/>
+              </a:defRPr>
+            </a:lvl9pPr>
+          </a:lstStyle>
           <a:p>
-            <a:endParaRPr lang="en-IE"/>
+            <a:pPr>
+              <a:lnSpc>
+                <a:spcPct val="107000"/>
+              </a:lnSpc>
+              <a:spcAft>
+                <a:spcPts val="800"/>
+              </a:spcAft>
+            </a:pPr>
+            <a:r>
+              <a:rPr lang="en-IE" sz="3600" dirty="0">
+                <a:latin typeface="+mj-lt"/>
+                <a:cs typeface="Arial" panose="020B0604020202020204" pitchFamily="34" charset="0"/>
+              </a:rPr>
+              <a:t>Best </a:t>
+            </a:r>
+            <a:r>
+              <a:rPr lang="en-IE" sz="3600" dirty="0" err="1">
+                <a:latin typeface="+mj-lt"/>
+                <a:cs typeface="Arial" panose="020B0604020202020204" pitchFamily="34" charset="0"/>
+              </a:rPr>
+              <a:t>HyperParameters</a:t>
+            </a:r>
+            <a:r>
+              <a:rPr lang="en-IE" sz="3600" dirty="0">
+                <a:latin typeface="+mj-lt"/>
+                <a:cs typeface="Arial" panose="020B0604020202020204" pitchFamily="34" charset="0"/>
+              </a:rPr>
+              <a:t> for </a:t>
+            </a:r>
+            <a:r>
+              <a:rPr lang="en-IE" sz="3600" b="1" dirty="0">
+                <a:latin typeface="+mj-lt"/>
+                <a:cs typeface="Arial" panose="020B0604020202020204" pitchFamily="34" charset="0"/>
+              </a:rPr>
+              <a:t>Random Forest Regression</a:t>
+            </a:r>
+            <a:r>
+              <a:rPr lang="en-IE" sz="3600" dirty="0">
+                <a:latin typeface="+mj-lt"/>
+                <a:cs typeface="Arial" panose="020B0604020202020204" pitchFamily="34" charset="0"/>
+              </a:rPr>
+              <a:t>: </a:t>
+            </a:r>
+            <a:br>
+              <a:rPr lang="en-IE" sz="3600" dirty="0">
+                <a:latin typeface="+mj-lt"/>
+                <a:cs typeface="Arial" panose="020B0604020202020204" pitchFamily="34" charset="0"/>
+              </a:rPr>
+            </a:br>
+            <a:r>
+              <a:rPr lang="en-IE" sz="3600" dirty="0">
+                <a:latin typeface="+mj-lt"/>
+                <a:cs typeface="Arial" panose="020B0604020202020204" pitchFamily="34" charset="0"/>
+              </a:rPr>
+              <a:t>{'</a:t>
+            </a:r>
+            <a:r>
+              <a:rPr lang="en-IE" sz="3600" dirty="0" err="1">
+                <a:latin typeface="+mj-lt"/>
+                <a:cs typeface="Arial" panose="020B0604020202020204" pitchFamily="34" charset="0"/>
+              </a:rPr>
+              <a:t>max_depth</a:t>
+            </a:r>
+            <a:r>
+              <a:rPr lang="en-IE" sz="3600" dirty="0">
+                <a:latin typeface="+mj-lt"/>
+                <a:cs typeface="Arial" panose="020B0604020202020204" pitchFamily="34" charset="0"/>
+              </a:rPr>
+              <a:t>': 10, '</a:t>
+            </a:r>
+            <a:r>
+              <a:rPr lang="en-IE" sz="3600" dirty="0" err="1">
+                <a:latin typeface="+mj-lt"/>
+                <a:cs typeface="Arial" panose="020B0604020202020204" pitchFamily="34" charset="0"/>
+              </a:rPr>
+              <a:t>max_features</a:t>
+            </a:r>
+            <a:r>
+              <a:rPr lang="en-IE" sz="3600" dirty="0">
+                <a:latin typeface="+mj-lt"/>
+                <a:cs typeface="Arial" panose="020B0604020202020204" pitchFamily="34" charset="0"/>
+              </a:rPr>
+              <a:t>': 10, '</a:t>
+            </a:r>
+            <a:r>
+              <a:rPr lang="en-IE" sz="3600" dirty="0" err="1">
+                <a:latin typeface="+mj-lt"/>
+                <a:cs typeface="Arial" panose="020B0604020202020204" pitchFamily="34" charset="0"/>
+              </a:rPr>
+              <a:t>min_samples_split</a:t>
+            </a:r>
+            <a:r>
+              <a:rPr lang="en-IE" sz="3600" dirty="0">
+                <a:latin typeface="+mj-lt"/>
+                <a:cs typeface="Arial" panose="020B0604020202020204" pitchFamily="34" charset="0"/>
+              </a:rPr>
+              <a:t>': 10, '</a:t>
+            </a:r>
+            <a:r>
+              <a:rPr lang="en-IE" sz="3600" dirty="0" err="1">
+                <a:latin typeface="+mj-lt"/>
+                <a:cs typeface="Arial" panose="020B0604020202020204" pitchFamily="34" charset="0"/>
+              </a:rPr>
+              <a:t>n_estimators</a:t>
+            </a:r>
+            <a:r>
+              <a:rPr lang="en-IE" sz="3600" dirty="0">
+                <a:latin typeface="+mj-lt"/>
+                <a:cs typeface="Arial" panose="020B0604020202020204" pitchFamily="34" charset="0"/>
+              </a:rPr>
+              <a:t>': 100}</a:t>
+            </a:r>
+          </a:p>
+          <a:p>
+            <a:pPr>
+              <a:lnSpc>
+                <a:spcPct val="107000"/>
+              </a:lnSpc>
+              <a:spcAft>
+                <a:spcPts val="800"/>
+              </a:spcAft>
+            </a:pPr>
+            <a:r>
+              <a:rPr lang="en-IE" sz="3600" dirty="0">
+                <a:latin typeface="+mj-lt"/>
+                <a:cs typeface="Arial" panose="020B0604020202020204" pitchFamily="34" charset="0"/>
+              </a:rPr>
+              <a:t>Best </a:t>
+            </a:r>
+            <a:r>
+              <a:rPr lang="en-IE" sz="3600" dirty="0" err="1">
+                <a:latin typeface="+mj-lt"/>
+                <a:cs typeface="Arial" panose="020B0604020202020204" pitchFamily="34" charset="0"/>
+              </a:rPr>
+              <a:t>HyperParameters</a:t>
+            </a:r>
+            <a:r>
+              <a:rPr lang="en-IE" sz="3600" dirty="0">
+                <a:latin typeface="+mj-lt"/>
+                <a:cs typeface="Arial" panose="020B0604020202020204" pitchFamily="34" charset="0"/>
+              </a:rPr>
+              <a:t> for </a:t>
+            </a:r>
+            <a:r>
+              <a:rPr lang="en-IE" sz="3600" b="1" dirty="0">
+                <a:latin typeface="+mj-lt"/>
+                <a:cs typeface="Arial" panose="020B0604020202020204" pitchFamily="34" charset="0"/>
+              </a:rPr>
+              <a:t>Linear Regression</a:t>
+            </a:r>
+            <a:r>
+              <a:rPr lang="en-IE" sz="3600" dirty="0">
+                <a:latin typeface="+mj-lt"/>
+                <a:cs typeface="Arial" panose="020B0604020202020204" pitchFamily="34" charset="0"/>
+              </a:rPr>
+              <a:t>: </a:t>
+            </a:r>
+            <a:br>
+              <a:rPr lang="en-IE" sz="3600" dirty="0">
+                <a:latin typeface="+mj-lt"/>
+                <a:cs typeface="Arial" panose="020B0604020202020204" pitchFamily="34" charset="0"/>
+              </a:rPr>
+            </a:br>
+            <a:r>
+              <a:rPr lang="en-IE" sz="3600" b="1" dirty="0">
+                <a:latin typeface="+mj-lt"/>
+                <a:cs typeface="Arial" panose="020B0604020202020204" pitchFamily="34" charset="0"/>
+              </a:rPr>
+              <a:t>Best Ridge parameters </a:t>
+            </a:r>
+            <a:r>
+              <a:rPr lang="en-IE" sz="3600" dirty="0">
+                <a:latin typeface="+mj-lt"/>
+                <a:cs typeface="Arial" panose="020B0604020202020204" pitchFamily="34" charset="0"/>
+              </a:rPr>
+              <a:t>:  {'alpha’: 1 , '</a:t>
+            </a:r>
+            <a:r>
+              <a:rPr lang="en-IE" sz="3600" dirty="0" err="1">
+                <a:latin typeface="+mj-lt"/>
+                <a:cs typeface="Arial" panose="020B0604020202020204" pitchFamily="34" charset="0"/>
+              </a:rPr>
+              <a:t>max_iter</a:t>
+            </a:r>
+            <a:r>
+              <a:rPr lang="en-IE" sz="3600" dirty="0">
+                <a:latin typeface="+mj-lt"/>
+                <a:cs typeface="Arial" panose="020B0604020202020204" pitchFamily="34" charset="0"/>
+              </a:rPr>
+              <a:t>': 1000, 'solver’: auto', '</a:t>
+            </a:r>
+            <a:r>
+              <a:rPr lang="en-IE" sz="3600" dirty="0" err="1">
+                <a:latin typeface="+mj-lt"/>
+                <a:cs typeface="Arial" panose="020B0604020202020204" pitchFamily="34" charset="0"/>
+              </a:rPr>
+              <a:t>tol</a:t>
+            </a:r>
+            <a:r>
+              <a:rPr lang="en-IE" sz="3600" dirty="0">
+                <a:latin typeface="+mj-lt"/>
+                <a:cs typeface="Arial" panose="020B0604020202020204" pitchFamily="34" charset="0"/>
+              </a:rPr>
+              <a:t>': 0.0001}</a:t>
+            </a:r>
+            <a:br>
+              <a:rPr lang="en-IE" sz="3600" dirty="0">
+                <a:latin typeface="+mj-lt"/>
+                <a:cs typeface="Arial" panose="020B0604020202020204" pitchFamily="34" charset="0"/>
+              </a:rPr>
+            </a:br>
+            <a:r>
+              <a:rPr lang="en-IE" sz="3600" b="1" dirty="0">
+                <a:latin typeface="+mj-lt"/>
+                <a:cs typeface="Arial" panose="020B0604020202020204" pitchFamily="34" charset="0"/>
+              </a:rPr>
+              <a:t>Best Lasso parameters </a:t>
+            </a:r>
+            <a:r>
+              <a:rPr lang="en-IE" sz="3600" dirty="0">
+                <a:latin typeface="+mj-lt"/>
+                <a:cs typeface="Arial" panose="020B0604020202020204" pitchFamily="34" charset="0"/>
+              </a:rPr>
+              <a:t>:  {'alpha’: 1, '</a:t>
+            </a:r>
+            <a:r>
+              <a:rPr lang="en-IE" sz="3600" dirty="0" err="1">
+                <a:latin typeface="+mj-lt"/>
+                <a:cs typeface="Arial" panose="020B0604020202020204" pitchFamily="34" charset="0"/>
+              </a:rPr>
+              <a:t>max_iter</a:t>
+            </a:r>
+            <a:r>
+              <a:rPr lang="en-IE" sz="3600" dirty="0">
+                <a:latin typeface="+mj-lt"/>
+                <a:cs typeface="Arial" panose="020B0604020202020204" pitchFamily="34" charset="0"/>
+              </a:rPr>
+              <a:t>': 1000, '</a:t>
+            </a:r>
+            <a:r>
+              <a:rPr lang="en-IE" sz="3600" dirty="0" err="1">
+                <a:latin typeface="+mj-lt"/>
+                <a:cs typeface="Arial" panose="020B0604020202020204" pitchFamily="34" charset="0"/>
+              </a:rPr>
+              <a:t>tol</a:t>
+            </a:r>
+            <a:r>
+              <a:rPr lang="en-IE" sz="3600" dirty="0">
+                <a:latin typeface="+mj-lt"/>
+                <a:cs typeface="Arial" panose="020B0604020202020204" pitchFamily="34" charset="0"/>
+              </a:rPr>
+              <a:t>': 0.0001}</a:t>
+            </a:r>
+            <a:br>
+              <a:rPr lang="en-IE" sz="3600" dirty="0">
+                <a:latin typeface="+mj-lt"/>
+                <a:cs typeface="Arial" panose="020B0604020202020204" pitchFamily="34" charset="0"/>
+              </a:rPr>
+            </a:br>
+            <a:r>
+              <a:rPr lang="en-IE" sz="3600" b="1" dirty="0">
+                <a:latin typeface="+mj-lt"/>
+                <a:cs typeface="Arial" panose="020B0604020202020204" pitchFamily="34" charset="0"/>
+              </a:rPr>
+              <a:t>Model Accuracy </a:t>
+            </a:r>
+            <a:r>
+              <a:rPr lang="en-IE" sz="3600" dirty="0">
+                <a:latin typeface="+mj-lt"/>
+                <a:cs typeface="Arial" panose="020B0604020202020204" pitchFamily="34" charset="0"/>
+              </a:rPr>
+              <a:t>: 0.95</a:t>
+            </a:r>
           </a:p>
         </p:txBody>
       </p:sp>
       <p:sp>
         <p:nvSpPr>
-          <p:cNvPr id="57" name="Text Placeholder 56">
+          <p:cNvPr id="34" name="Text Placeholder 7">
             <a:extLst>
               <a:ext uri="{FF2B5EF4-FFF2-40B4-BE49-F238E27FC236}">
-                <a16:creationId xmlns:a16="http://schemas.microsoft.com/office/drawing/2014/main" id="{58F2BF4B-AFD1-1CB3-9B1A-C418283BD4CE}"/>
+                <a16:creationId xmlns:a16="http://schemas.microsoft.com/office/drawing/2014/main" id="{AE6AD5F5-373F-559B-6041-65DE4C2B1673}"/>
               </a:ext>
             </a:extLst>
           </p:cNvPr>
-          <p:cNvSpPr>
-            <a:spLocks noGrp="1"/>
+          <p:cNvSpPr txBox="1">
+            <a:spLocks/>
           </p:cNvSpPr>
-          <p:nvPr>
-            <p:ph type="body" sz="quarter" idx="28"/>
-          </p:nvPr>
+          <p:nvPr/>
         </p:nvSpPr>
-        <p:spPr/>
+        <p:spPr>
+          <a:xfrm>
+            <a:off x="22377404" y="23698824"/>
+            <a:ext cx="10058400" cy="800211"/>
+          </a:xfrm>
+          <a:prstGeom prst="rect">
+            <a:avLst/>
+          </a:prstGeom>
+          <a:noFill/>
+        </p:spPr>
         <p:txBody>
-          <a:bodyPr/>
-          <a:lstStyle/>
+          <a:bodyPr lIns="91436" tIns="91436" rIns="91436" bIns="91436" anchor="ctr" anchorCtr="0">
+            <a:spAutoFit/>
+          </a:bodyPr>
+          <a:lstStyle>
+            <a:lvl1pPr marL="0" indent="0" algn="ctr" defTabSz="4388900" rtl="0" eaLnBrk="1" latinLnBrk="0" hangingPunct="1">
+              <a:spcBef>
+                <a:spcPct val="20000"/>
+              </a:spcBef>
+              <a:buFont typeface="Arial" pitchFamily="34" charset="0"/>
+              <a:buNone/>
+              <a:defRPr sz="3700" b="1" u="sng" kern="1200" baseline="0">
+                <a:solidFill>
+                  <a:schemeClr val="accent5">
+                    <a:lumMod val="50000"/>
+                  </a:schemeClr>
+                </a:solidFill>
+                <a:latin typeface="+mn-lt"/>
+                <a:ea typeface="+mn-ea"/>
+                <a:cs typeface="+mn-cs"/>
+              </a:defRPr>
+            </a:lvl1pPr>
+            <a:lvl2pPr marL="3565982" indent="-1371531" algn="l" defTabSz="4388900" rtl="0" eaLnBrk="1" latinLnBrk="0" hangingPunct="1">
+              <a:spcBef>
+                <a:spcPct val="20000"/>
+              </a:spcBef>
+              <a:buFont typeface="Arial" pitchFamily="34" charset="0"/>
+              <a:buChar char="–"/>
+              <a:defRPr sz="13500" kern="1200">
+                <a:solidFill>
+                  <a:schemeClr val="tx1"/>
+                </a:solidFill>
+                <a:latin typeface="+mn-lt"/>
+                <a:ea typeface="+mn-ea"/>
+                <a:cs typeface="+mn-cs"/>
+              </a:defRPr>
+            </a:lvl2pPr>
+            <a:lvl3pPr marL="5486126" indent="-1097226" algn="l" defTabSz="4388900" rtl="0" eaLnBrk="1" latinLnBrk="0" hangingPunct="1">
+              <a:spcBef>
+                <a:spcPct val="20000"/>
+              </a:spcBef>
+              <a:buFont typeface="Arial" pitchFamily="34" charset="0"/>
+              <a:buChar char="•"/>
+              <a:defRPr sz="11600" kern="1200">
+                <a:solidFill>
+                  <a:schemeClr val="tx1"/>
+                </a:solidFill>
+                <a:latin typeface="+mn-lt"/>
+                <a:ea typeface="+mn-ea"/>
+                <a:cs typeface="+mn-cs"/>
+              </a:defRPr>
+            </a:lvl3pPr>
+            <a:lvl4pPr marL="7680577" indent="-1097226" algn="l" defTabSz="4388900" rtl="0" eaLnBrk="1" latinLnBrk="0" hangingPunct="1">
+              <a:spcBef>
+                <a:spcPct val="20000"/>
+              </a:spcBef>
+              <a:buFont typeface="Arial" pitchFamily="34" charset="0"/>
+              <a:buChar char="–"/>
+              <a:defRPr sz="9600" kern="1200">
+                <a:solidFill>
+                  <a:schemeClr val="tx1"/>
+                </a:solidFill>
+                <a:latin typeface="+mn-lt"/>
+                <a:ea typeface="+mn-ea"/>
+                <a:cs typeface="+mn-cs"/>
+              </a:defRPr>
+            </a:lvl4pPr>
+            <a:lvl5pPr marL="9875026" indent="-1097226" algn="l" defTabSz="4388900" rtl="0" eaLnBrk="1" latinLnBrk="0" hangingPunct="1">
+              <a:spcBef>
+                <a:spcPct val="20000"/>
+              </a:spcBef>
+              <a:buFont typeface="Arial" pitchFamily="34" charset="0"/>
+              <a:buChar char="»"/>
+              <a:defRPr sz="9600" kern="1200">
+                <a:solidFill>
+                  <a:schemeClr val="tx1"/>
+                </a:solidFill>
+                <a:latin typeface="+mn-lt"/>
+                <a:ea typeface="+mn-ea"/>
+                <a:cs typeface="+mn-cs"/>
+              </a:defRPr>
+            </a:lvl5pPr>
+            <a:lvl6pPr marL="12069477" indent="-1097226" algn="l" defTabSz="4388900" rtl="0" eaLnBrk="1" latinLnBrk="0" hangingPunct="1">
+              <a:spcBef>
+                <a:spcPct val="20000"/>
+              </a:spcBef>
+              <a:buFont typeface="Arial" pitchFamily="34" charset="0"/>
+              <a:buChar char="•"/>
+              <a:defRPr sz="9600" kern="1200">
+                <a:solidFill>
+                  <a:schemeClr val="tx1"/>
+                </a:solidFill>
+                <a:latin typeface="+mn-lt"/>
+                <a:ea typeface="+mn-ea"/>
+                <a:cs typeface="+mn-cs"/>
+              </a:defRPr>
+            </a:lvl6pPr>
+            <a:lvl7pPr marL="14263926" indent="-1097226" algn="l" defTabSz="4388900" rtl="0" eaLnBrk="1" latinLnBrk="0" hangingPunct="1">
+              <a:spcBef>
+                <a:spcPct val="20000"/>
+              </a:spcBef>
+              <a:buFont typeface="Arial" pitchFamily="34" charset="0"/>
+              <a:buChar char="•"/>
+              <a:defRPr sz="9600" kern="1200">
+                <a:solidFill>
+                  <a:schemeClr val="tx1"/>
+                </a:solidFill>
+                <a:latin typeface="+mn-lt"/>
+                <a:ea typeface="+mn-ea"/>
+                <a:cs typeface="+mn-cs"/>
+              </a:defRPr>
+            </a:lvl7pPr>
+            <a:lvl8pPr marL="16458377" indent="-1097226" algn="l" defTabSz="4388900" rtl="0" eaLnBrk="1" latinLnBrk="0" hangingPunct="1">
+              <a:spcBef>
+                <a:spcPct val="20000"/>
+              </a:spcBef>
+              <a:buFont typeface="Arial" pitchFamily="34" charset="0"/>
+              <a:buChar char="•"/>
+              <a:defRPr sz="9600" kern="1200">
+                <a:solidFill>
+                  <a:schemeClr val="tx1"/>
+                </a:solidFill>
+                <a:latin typeface="+mn-lt"/>
+                <a:ea typeface="+mn-ea"/>
+                <a:cs typeface="+mn-cs"/>
+              </a:defRPr>
+            </a:lvl8pPr>
+            <a:lvl9pPr marL="18652827" indent="-1097226" algn="l" defTabSz="4388900" rtl="0" eaLnBrk="1" latinLnBrk="0" hangingPunct="1">
+              <a:spcBef>
+                <a:spcPct val="20000"/>
+              </a:spcBef>
+              <a:buFont typeface="Arial" pitchFamily="34" charset="0"/>
+              <a:buChar char="•"/>
+              <a:defRPr sz="9600" kern="1200">
+                <a:solidFill>
+                  <a:schemeClr val="tx1"/>
+                </a:solidFill>
+                <a:latin typeface="+mn-lt"/>
+                <a:ea typeface="+mn-ea"/>
+                <a:cs typeface="+mn-cs"/>
+              </a:defRPr>
+            </a:lvl9pPr>
+          </a:lstStyle>
           <a:p>
-            <a:endParaRPr lang="en-IE"/>
+            <a:r>
+              <a:rPr lang="en-US" sz="4000" dirty="0" err="1">
+                <a:solidFill>
+                  <a:schemeClr val="tx2"/>
+                </a:solidFill>
+                <a:latin typeface="Arial" panose="020B0604020202020204" pitchFamily="34" charset="0"/>
+                <a:cs typeface="Arial" panose="020B0604020202020204" pitchFamily="34" charset="0"/>
+              </a:rPr>
+              <a:t>HyperParameters</a:t>
+            </a:r>
+            <a:endParaRPr lang="en-US" sz="4000" dirty="0">
+              <a:solidFill>
+                <a:schemeClr val="tx2"/>
+              </a:solidFill>
+              <a:latin typeface="Arial" panose="020B0604020202020204" pitchFamily="34" charset="0"/>
+              <a:cs typeface="Arial" panose="020B0604020202020204" pitchFamily="34" charset="0"/>
+            </a:endParaRPr>
+          </a:p>
+        </p:txBody>
+      </p:sp>
+      <p:sp>
+        <p:nvSpPr>
+          <p:cNvPr id="35" name="Text Placeholder 20">
+            <a:extLst>
+              <a:ext uri="{FF2B5EF4-FFF2-40B4-BE49-F238E27FC236}">
+                <a16:creationId xmlns:a16="http://schemas.microsoft.com/office/drawing/2014/main" id="{FD94646A-E979-BA88-48F7-C8C2CAD66753}"/>
+              </a:ext>
+            </a:extLst>
+          </p:cNvPr>
+          <p:cNvSpPr txBox="1">
+            <a:spLocks/>
+          </p:cNvSpPr>
+          <p:nvPr/>
+        </p:nvSpPr>
+        <p:spPr>
+          <a:xfrm>
+            <a:off x="22385343" y="6378481"/>
+            <a:ext cx="10048874" cy="2123636"/>
+          </a:xfrm>
+          <a:prstGeom prst="rect">
+            <a:avLst/>
+          </a:prstGeom>
+        </p:spPr>
+        <p:txBody>
+          <a:bodyPr wrap="square" lIns="228589" tIns="228589" rIns="228589" bIns="228589">
+            <a:spAutoFit/>
+          </a:bodyPr>
+          <a:lstStyle>
+            <a:lvl1pPr marL="0" indent="0" algn="l" defTabSz="4388900" rtl="0" eaLnBrk="1" latinLnBrk="0" hangingPunct="1">
+              <a:spcBef>
+                <a:spcPct val="20000"/>
+              </a:spcBef>
+              <a:buFont typeface="Arial" pitchFamily="34" charset="0"/>
+              <a:buNone/>
+              <a:defRPr sz="2500" kern="1200">
+                <a:solidFill>
+                  <a:schemeClr val="accent5">
+                    <a:lumMod val="50000"/>
+                  </a:schemeClr>
+                </a:solidFill>
+                <a:latin typeface="Times New Roman" pitchFamily="18" charset="0"/>
+                <a:ea typeface="+mn-ea"/>
+                <a:cs typeface="Times New Roman" pitchFamily="18" charset="0"/>
+              </a:defRPr>
+            </a:lvl1pPr>
+            <a:lvl2pPr marL="1485825" indent="-571471" algn="l" defTabSz="4388900" rtl="0" eaLnBrk="1" latinLnBrk="0" hangingPunct="1">
+              <a:spcBef>
+                <a:spcPct val="20000"/>
+              </a:spcBef>
+              <a:buFont typeface="Arial" pitchFamily="34" charset="0"/>
+              <a:buChar char="–"/>
+              <a:defRPr sz="2500" kern="1200">
+                <a:solidFill>
+                  <a:schemeClr val="tx1"/>
+                </a:solidFill>
+                <a:latin typeface="Trebuchet MS" pitchFamily="34" charset="0"/>
+                <a:ea typeface="+mn-ea"/>
+                <a:cs typeface="+mn-cs"/>
+              </a:defRPr>
+            </a:lvl2pPr>
+            <a:lvl3pPr marL="2057297" indent="-571471" algn="l" defTabSz="4388900" rtl="0" eaLnBrk="1" latinLnBrk="0" hangingPunct="1">
+              <a:spcBef>
+                <a:spcPct val="20000"/>
+              </a:spcBef>
+              <a:buFont typeface="Arial" pitchFamily="34" charset="0"/>
+              <a:buChar char="•"/>
+              <a:defRPr sz="2500" kern="1200">
+                <a:solidFill>
+                  <a:schemeClr val="tx1"/>
+                </a:solidFill>
+                <a:latin typeface="Trebuchet MS" pitchFamily="34" charset="0"/>
+                <a:ea typeface="+mn-ea"/>
+                <a:cs typeface="+mn-cs"/>
+              </a:defRPr>
+            </a:lvl3pPr>
+            <a:lvl4pPr marL="2685916" indent="-628619" algn="l" defTabSz="4388900" rtl="0" eaLnBrk="1" latinLnBrk="0" hangingPunct="1">
+              <a:spcBef>
+                <a:spcPct val="20000"/>
+              </a:spcBef>
+              <a:buFont typeface="Arial" pitchFamily="34" charset="0"/>
+              <a:buChar char="–"/>
+              <a:defRPr sz="2500" kern="1200">
+                <a:solidFill>
+                  <a:schemeClr val="tx1"/>
+                </a:solidFill>
+                <a:latin typeface="Trebuchet MS" pitchFamily="34" charset="0"/>
+                <a:ea typeface="+mn-ea"/>
+                <a:cs typeface="+mn-cs"/>
+              </a:defRPr>
+            </a:lvl4pPr>
+            <a:lvl5pPr marL="3143093" indent="-457177" algn="l" defTabSz="4388900" rtl="0" eaLnBrk="1" latinLnBrk="0" hangingPunct="1">
+              <a:spcBef>
+                <a:spcPct val="20000"/>
+              </a:spcBef>
+              <a:buFont typeface="Arial" pitchFamily="34" charset="0"/>
+              <a:buChar char="»"/>
+              <a:defRPr sz="2500" kern="1200">
+                <a:solidFill>
+                  <a:schemeClr val="tx1"/>
+                </a:solidFill>
+                <a:latin typeface="Trebuchet MS" pitchFamily="34" charset="0"/>
+                <a:ea typeface="+mn-ea"/>
+                <a:cs typeface="+mn-cs"/>
+              </a:defRPr>
+            </a:lvl5pPr>
+            <a:lvl6pPr marL="12069477" indent="-1097226" algn="l" defTabSz="4388900" rtl="0" eaLnBrk="1" latinLnBrk="0" hangingPunct="1">
+              <a:spcBef>
+                <a:spcPct val="20000"/>
+              </a:spcBef>
+              <a:buFont typeface="Arial" pitchFamily="34" charset="0"/>
+              <a:buChar char="•"/>
+              <a:defRPr sz="9600" kern="1200">
+                <a:solidFill>
+                  <a:schemeClr val="tx1"/>
+                </a:solidFill>
+                <a:latin typeface="+mn-lt"/>
+                <a:ea typeface="+mn-ea"/>
+                <a:cs typeface="+mn-cs"/>
+              </a:defRPr>
+            </a:lvl6pPr>
+            <a:lvl7pPr marL="14263926" indent="-1097226" algn="l" defTabSz="4388900" rtl="0" eaLnBrk="1" latinLnBrk="0" hangingPunct="1">
+              <a:spcBef>
+                <a:spcPct val="20000"/>
+              </a:spcBef>
+              <a:buFont typeface="Arial" pitchFamily="34" charset="0"/>
+              <a:buChar char="•"/>
+              <a:defRPr sz="9600" kern="1200">
+                <a:solidFill>
+                  <a:schemeClr val="tx1"/>
+                </a:solidFill>
+                <a:latin typeface="+mn-lt"/>
+                <a:ea typeface="+mn-ea"/>
+                <a:cs typeface="+mn-cs"/>
+              </a:defRPr>
+            </a:lvl7pPr>
+            <a:lvl8pPr marL="16458377" indent="-1097226" algn="l" defTabSz="4388900" rtl="0" eaLnBrk="1" latinLnBrk="0" hangingPunct="1">
+              <a:spcBef>
+                <a:spcPct val="20000"/>
+              </a:spcBef>
+              <a:buFont typeface="Arial" pitchFamily="34" charset="0"/>
+              <a:buChar char="•"/>
+              <a:defRPr sz="9600" kern="1200">
+                <a:solidFill>
+                  <a:schemeClr val="tx1"/>
+                </a:solidFill>
+                <a:latin typeface="+mn-lt"/>
+                <a:ea typeface="+mn-ea"/>
+                <a:cs typeface="+mn-cs"/>
+              </a:defRPr>
+            </a:lvl8pPr>
+            <a:lvl9pPr marL="18652827" indent="-1097226" algn="l" defTabSz="4388900" rtl="0" eaLnBrk="1" latinLnBrk="0" hangingPunct="1">
+              <a:spcBef>
+                <a:spcPct val="20000"/>
+              </a:spcBef>
+              <a:buFont typeface="Arial" pitchFamily="34" charset="0"/>
+              <a:buChar char="•"/>
+              <a:defRPr sz="9600" kern="1200">
+                <a:solidFill>
+                  <a:schemeClr val="tx1"/>
+                </a:solidFill>
+                <a:latin typeface="+mn-lt"/>
+                <a:ea typeface="+mn-ea"/>
+                <a:cs typeface="+mn-cs"/>
+              </a:defRPr>
+            </a:lvl9pPr>
+          </a:lstStyle>
+          <a:p>
+            <a:r>
+              <a:rPr lang="en-IE" sz="3600">
+                <a:solidFill>
+                  <a:schemeClr val="tx1"/>
+                </a:solidFill>
+                <a:latin typeface="+mj-lt"/>
+                <a:cs typeface="Arial" panose="020B0604020202020204" pitchFamily="34" charset="0"/>
+              </a:rPr>
+              <a:t>Performing an exploratory data analysis on the data, we are able to find the features that drive the rental price.</a:t>
+            </a:r>
+            <a:endParaRPr lang="en-IE" sz="3600" dirty="0">
+              <a:solidFill>
+                <a:schemeClr val="tx1"/>
+              </a:solidFill>
+              <a:latin typeface="+mj-lt"/>
+              <a:cs typeface="Arial" panose="020B0604020202020204" pitchFamily="34" charset="0"/>
+            </a:endParaRPr>
+          </a:p>
+        </p:txBody>
+      </p:sp>
+      <p:pic>
+        <p:nvPicPr>
+          <p:cNvPr id="36" name="Picture 35" descr="A graph of a rental cost&#10;&#10;AI-generated content may be incorrect.">
+            <a:extLst>
+              <a:ext uri="{FF2B5EF4-FFF2-40B4-BE49-F238E27FC236}">
+                <a16:creationId xmlns:a16="http://schemas.microsoft.com/office/drawing/2014/main" id="{B63AB3CA-3A95-F942-A587-4DEC728BA661}"/>
+              </a:ext>
+            </a:extLst>
+          </p:cNvPr>
+          <p:cNvPicPr>
+            <a:picLocks noChangeAspect="1"/>
+          </p:cNvPicPr>
+          <p:nvPr/>
+        </p:nvPicPr>
+        <p:blipFill>
+          <a:blip r:embed="rId7"/>
+          <a:stretch>
+            <a:fillRect/>
+          </a:stretch>
+        </p:blipFill>
+        <p:spPr>
+          <a:xfrm>
+            <a:off x="22584341" y="13872184"/>
+            <a:ext cx="9666672" cy="5570171"/>
+          </a:xfrm>
+          <a:prstGeom prst="rect">
+            <a:avLst/>
+          </a:prstGeom>
+        </p:spPr>
+      </p:pic>
+      <p:sp>
+        <p:nvSpPr>
+          <p:cNvPr id="46" name="Text Placeholder 8">
+            <a:extLst>
+              <a:ext uri="{FF2B5EF4-FFF2-40B4-BE49-F238E27FC236}">
+                <a16:creationId xmlns:a16="http://schemas.microsoft.com/office/drawing/2014/main" id="{8A2BC07B-0562-4DC1-F888-EC286AF6C626}"/>
+              </a:ext>
+            </a:extLst>
+          </p:cNvPr>
+          <p:cNvSpPr txBox="1">
+            <a:spLocks/>
+          </p:cNvSpPr>
+          <p:nvPr/>
+        </p:nvSpPr>
+        <p:spPr>
+          <a:xfrm>
+            <a:off x="32933068" y="19103805"/>
+            <a:ext cx="10047018" cy="677100"/>
+          </a:xfrm>
+          <a:prstGeom prst="rect">
+            <a:avLst/>
+          </a:prstGeom>
+          <a:noFill/>
+        </p:spPr>
+        <p:txBody>
+          <a:bodyPr wrap="square" lIns="91436" tIns="91436" rIns="91436" bIns="91436" anchor="ctr" anchorCtr="0">
+            <a:spAutoFit/>
+          </a:bodyPr>
+          <a:lstStyle>
+            <a:lvl1pPr marL="0" indent="0" algn="ctr" defTabSz="4388900" rtl="0" eaLnBrk="1" latinLnBrk="0" hangingPunct="1">
+              <a:spcBef>
+                <a:spcPct val="20000"/>
+              </a:spcBef>
+              <a:buFont typeface="Arial" pitchFamily="34" charset="0"/>
+              <a:buNone/>
+              <a:defRPr sz="3700" b="1" u="sng" kern="1200" baseline="0">
+                <a:solidFill>
+                  <a:schemeClr val="accent5">
+                    <a:lumMod val="50000"/>
+                  </a:schemeClr>
+                </a:solidFill>
+                <a:latin typeface="+mn-lt"/>
+                <a:ea typeface="+mn-ea"/>
+                <a:cs typeface="+mn-cs"/>
+              </a:defRPr>
+            </a:lvl1pPr>
+            <a:lvl2pPr marL="3565982" indent="-1371531" algn="l" defTabSz="4388900" rtl="0" eaLnBrk="1" latinLnBrk="0" hangingPunct="1">
+              <a:spcBef>
+                <a:spcPct val="20000"/>
+              </a:spcBef>
+              <a:buFont typeface="Arial" pitchFamily="34" charset="0"/>
+              <a:buChar char="–"/>
+              <a:defRPr sz="13500" kern="1200">
+                <a:solidFill>
+                  <a:schemeClr val="tx1"/>
+                </a:solidFill>
+                <a:latin typeface="+mn-lt"/>
+                <a:ea typeface="+mn-ea"/>
+                <a:cs typeface="+mn-cs"/>
+              </a:defRPr>
+            </a:lvl2pPr>
+            <a:lvl3pPr marL="5486126" indent="-1097226" algn="l" defTabSz="4388900" rtl="0" eaLnBrk="1" latinLnBrk="0" hangingPunct="1">
+              <a:spcBef>
+                <a:spcPct val="20000"/>
+              </a:spcBef>
+              <a:buFont typeface="Arial" pitchFamily="34" charset="0"/>
+              <a:buChar char="•"/>
+              <a:defRPr sz="11600" kern="1200">
+                <a:solidFill>
+                  <a:schemeClr val="tx1"/>
+                </a:solidFill>
+                <a:latin typeface="+mn-lt"/>
+                <a:ea typeface="+mn-ea"/>
+                <a:cs typeface="+mn-cs"/>
+              </a:defRPr>
+            </a:lvl3pPr>
+            <a:lvl4pPr marL="7680577" indent="-1097226" algn="l" defTabSz="4388900" rtl="0" eaLnBrk="1" latinLnBrk="0" hangingPunct="1">
+              <a:spcBef>
+                <a:spcPct val="20000"/>
+              </a:spcBef>
+              <a:buFont typeface="Arial" pitchFamily="34" charset="0"/>
+              <a:buChar char="–"/>
+              <a:defRPr sz="9600" kern="1200">
+                <a:solidFill>
+                  <a:schemeClr val="tx1"/>
+                </a:solidFill>
+                <a:latin typeface="+mn-lt"/>
+                <a:ea typeface="+mn-ea"/>
+                <a:cs typeface="+mn-cs"/>
+              </a:defRPr>
+            </a:lvl4pPr>
+            <a:lvl5pPr marL="9875026" indent="-1097226" algn="l" defTabSz="4388900" rtl="0" eaLnBrk="1" latinLnBrk="0" hangingPunct="1">
+              <a:spcBef>
+                <a:spcPct val="20000"/>
+              </a:spcBef>
+              <a:buFont typeface="Arial" pitchFamily="34" charset="0"/>
+              <a:buChar char="»"/>
+              <a:defRPr sz="9600" kern="1200">
+                <a:solidFill>
+                  <a:schemeClr val="tx1"/>
+                </a:solidFill>
+                <a:latin typeface="+mn-lt"/>
+                <a:ea typeface="+mn-ea"/>
+                <a:cs typeface="+mn-cs"/>
+              </a:defRPr>
+            </a:lvl5pPr>
+            <a:lvl6pPr marL="12069477" indent="-1097226" algn="l" defTabSz="4388900" rtl="0" eaLnBrk="1" latinLnBrk="0" hangingPunct="1">
+              <a:spcBef>
+                <a:spcPct val="20000"/>
+              </a:spcBef>
+              <a:buFont typeface="Arial" pitchFamily="34" charset="0"/>
+              <a:buChar char="•"/>
+              <a:defRPr sz="9600" kern="1200">
+                <a:solidFill>
+                  <a:schemeClr val="tx1"/>
+                </a:solidFill>
+                <a:latin typeface="+mn-lt"/>
+                <a:ea typeface="+mn-ea"/>
+                <a:cs typeface="+mn-cs"/>
+              </a:defRPr>
+            </a:lvl6pPr>
+            <a:lvl7pPr marL="14263926" indent="-1097226" algn="l" defTabSz="4388900" rtl="0" eaLnBrk="1" latinLnBrk="0" hangingPunct="1">
+              <a:spcBef>
+                <a:spcPct val="20000"/>
+              </a:spcBef>
+              <a:buFont typeface="Arial" pitchFamily="34" charset="0"/>
+              <a:buChar char="•"/>
+              <a:defRPr sz="9600" kern="1200">
+                <a:solidFill>
+                  <a:schemeClr val="tx1"/>
+                </a:solidFill>
+                <a:latin typeface="+mn-lt"/>
+                <a:ea typeface="+mn-ea"/>
+                <a:cs typeface="+mn-cs"/>
+              </a:defRPr>
+            </a:lvl7pPr>
+            <a:lvl8pPr marL="16458377" indent="-1097226" algn="l" defTabSz="4388900" rtl="0" eaLnBrk="1" latinLnBrk="0" hangingPunct="1">
+              <a:spcBef>
+                <a:spcPct val="20000"/>
+              </a:spcBef>
+              <a:buFont typeface="Arial" pitchFamily="34" charset="0"/>
+              <a:buChar char="•"/>
+              <a:defRPr sz="9600" kern="1200">
+                <a:solidFill>
+                  <a:schemeClr val="tx1"/>
+                </a:solidFill>
+                <a:latin typeface="+mn-lt"/>
+                <a:ea typeface="+mn-ea"/>
+                <a:cs typeface="+mn-cs"/>
+              </a:defRPr>
+            </a:lvl8pPr>
+            <a:lvl9pPr marL="18652827" indent="-1097226" algn="l" defTabSz="4388900" rtl="0" eaLnBrk="1" latinLnBrk="0" hangingPunct="1">
+              <a:spcBef>
+                <a:spcPct val="20000"/>
+              </a:spcBef>
+              <a:buFont typeface="Arial" pitchFamily="34" charset="0"/>
+              <a:buChar char="•"/>
+              <a:defRPr sz="9600" kern="1200">
+                <a:solidFill>
+                  <a:schemeClr val="tx1"/>
+                </a:solidFill>
+                <a:latin typeface="+mn-lt"/>
+                <a:ea typeface="+mn-ea"/>
+                <a:cs typeface="+mn-cs"/>
+              </a:defRPr>
+            </a:lvl9pPr>
+          </a:lstStyle>
+          <a:p>
+            <a:r>
+              <a:rPr lang="en-US" sz="3200">
+                <a:solidFill>
+                  <a:schemeClr val="tx2"/>
+                </a:solidFill>
+                <a:latin typeface="Arial" panose="020B0604020202020204" pitchFamily="34" charset="0"/>
+                <a:cs typeface="Arial" panose="020B0604020202020204" pitchFamily="34" charset="0"/>
+              </a:rPr>
+              <a:t>CONCLUSIONS</a:t>
+            </a:r>
+            <a:endParaRPr lang="en-US" sz="3200" dirty="0">
+              <a:solidFill>
+                <a:schemeClr val="tx2"/>
+              </a:solidFill>
+              <a:latin typeface="Arial" panose="020B0604020202020204" pitchFamily="34" charset="0"/>
+              <a:cs typeface="Arial" panose="020B0604020202020204" pitchFamily="34" charset="0"/>
+            </a:endParaRPr>
+          </a:p>
+        </p:txBody>
+      </p:sp>
+      <p:sp>
+        <p:nvSpPr>
+          <p:cNvPr id="47" name="Text Placeholder 10">
+            <a:extLst>
+              <a:ext uri="{FF2B5EF4-FFF2-40B4-BE49-F238E27FC236}">
+                <a16:creationId xmlns:a16="http://schemas.microsoft.com/office/drawing/2014/main" id="{9B3852C7-5057-0CD6-2971-8CF89FE64A87}"/>
+              </a:ext>
+            </a:extLst>
+          </p:cNvPr>
+          <p:cNvSpPr txBox="1">
+            <a:spLocks/>
+          </p:cNvSpPr>
+          <p:nvPr/>
+        </p:nvSpPr>
+        <p:spPr>
+          <a:xfrm>
+            <a:off x="33418232" y="24758117"/>
+            <a:ext cx="10047018" cy="754045"/>
+          </a:xfrm>
+          <a:prstGeom prst="rect">
+            <a:avLst/>
+          </a:prstGeom>
+          <a:noFill/>
+        </p:spPr>
+        <p:txBody>
+          <a:bodyPr wrap="square" lIns="91436" tIns="91436" rIns="91436" bIns="91436" anchor="ctr" anchorCtr="0">
+            <a:spAutoFit/>
+          </a:bodyPr>
+          <a:lstStyle>
+            <a:lvl1pPr marL="0" indent="0" algn="ctr" defTabSz="4388900" rtl="0" eaLnBrk="1" latinLnBrk="0" hangingPunct="1">
+              <a:spcBef>
+                <a:spcPct val="20000"/>
+              </a:spcBef>
+              <a:buFont typeface="Arial" pitchFamily="34" charset="0"/>
+              <a:buNone/>
+              <a:defRPr sz="3700" b="1" u="sng" kern="1200" baseline="0">
+                <a:solidFill>
+                  <a:schemeClr val="accent5">
+                    <a:lumMod val="50000"/>
+                  </a:schemeClr>
+                </a:solidFill>
+                <a:latin typeface="+mn-lt"/>
+                <a:ea typeface="+mn-ea"/>
+                <a:cs typeface="+mn-cs"/>
+              </a:defRPr>
+            </a:lvl1pPr>
+            <a:lvl2pPr marL="3565982" indent="-1371531" algn="l" defTabSz="4388900" rtl="0" eaLnBrk="1" latinLnBrk="0" hangingPunct="1">
+              <a:spcBef>
+                <a:spcPct val="20000"/>
+              </a:spcBef>
+              <a:buFont typeface="Arial" pitchFamily="34" charset="0"/>
+              <a:buChar char="–"/>
+              <a:defRPr sz="13500" kern="1200">
+                <a:solidFill>
+                  <a:schemeClr val="tx1"/>
+                </a:solidFill>
+                <a:latin typeface="+mn-lt"/>
+                <a:ea typeface="+mn-ea"/>
+                <a:cs typeface="+mn-cs"/>
+              </a:defRPr>
+            </a:lvl2pPr>
+            <a:lvl3pPr marL="5486126" indent="-1097226" algn="l" defTabSz="4388900" rtl="0" eaLnBrk="1" latinLnBrk="0" hangingPunct="1">
+              <a:spcBef>
+                <a:spcPct val="20000"/>
+              </a:spcBef>
+              <a:buFont typeface="Arial" pitchFamily="34" charset="0"/>
+              <a:buChar char="•"/>
+              <a:defRPr sz="11600" kern="1200">
+                <a:solidFill>
+                  <a:schemeClr val="tx1"/>
+                </a:solidFill>
+                <a:latin typeface="+mn-lt"/>
+                <a:ea typeface="+mn-ea"/>
+                <a:cs typeface="+mn-cs"/>
+              </a:defRPr>
+            </a:lvl3pPr>
+            <a:lvl4pPr marL="7680577" indent="-1097226" algn="l" defTabSz="4388900" rtl="0" eaLnBrk="1" latinLnBrk="0" hangingPunct="1">
+              <a:spcBef>
+                <a:spcPct val="20000"/>
+              </a:spcBef>
+              <a:buFont typeface="Arial" pitchFamily="34" charset="0"/>
+              <a:buChar char="–"/>
+              <a:defRPr sz="9600" kern="1200">
+                <a:solidFill>
+                  <a:schemeClr val="tx1"/>
+                </a:solidFill>
+                <a:latin typeface="+mn-lt"/>
+                <a:ea typeface="+mn-ea"/>
+                <a:cs typeface="+mn-cs"/>
+              </a:defRPr>
+            </a:lvl4pPr>
+            <a:lvl5pPr marL="9875026" indent="-1097226" algn="l" defTabSz="4388900" rtl="0" eaLnBrk="1" latinLnBrk="0" hangingPunct="1">
+              <a:spcBef>
+                <a:spcPct val="20000"/>
+              </a:spcBef>
+              <a:buFont typeface="Arial" pitchFamily="34" charset="0"/>
+              <a:buChar char="»"/>
+              <a:defRPr sz="9600" kern="1200">
+                <a:solidFill>
+                  <a:schemeClr val="tx1"/>
+                </a:solidFill>
+                <a:latin typeface="+mn-lt"/>
+                <a:ea typeface="+mn-ea"/>
+                <a:cs typeface="+mn-cs"/>
+              </a:defRPr>
+            </a:lvl5pPr>
+            <a:lvl6pPr marL="12069477" indent="-1097226" algn="l" defTabSz="4388900" rtl="0" eaLnBrk="1" latinLnBrk="0" hangingPunct="1">
+              <a:spcBef>
+                <a:spcPct val="20000"/>
+              </a:spcBef>
+              <a:buFont typeface="Arial" pitchFamily="34" charset="0"/>
+              <a:buChar char="•"/>
+              <a:defRPr sz="9600" kern="1200">
+                <a:solidFill>
+                  <a:schemeClr val="tx1"/>
+                </a:solidFill>
+                <a:latin typeface="+mn-lt"/>
+                <a:ea typeface="+mn-ea"/>
+                <a:cs typeface="+mn-cs"/>
+              </a:defRPr>
+            </a:lvl6pPr>
+            <a:lvl7pPr marL="14263926" indent="-1097226" algn="l" defTabSz="4388900" rtl="0" eaLnBrk="1" latinLnBrk="0" hangingPunct="1">
+              <a:spcBef>
+                <a:spcPct val="20000"/>
+              </a:spcBef>
+              <a:buFont typeface="Arial" pitchFamily="34" charset="0"/>
+              <a:buChar char="•"/>
+              <a:defRPr sz="9600" kern="1200">
+                <a:solidFill>
+                  <a:schemeClr val="tx1"/>
+                </a:solidFill>
+                <a:latin typeface="+mn-lt"/>
+                <a:ea typeface="+mn-ea"/>
+                <a:cs typeface="+mn-cs"/>
+              </a:defRPr>
+            </a:lvl7pPr>
+            <a:lvl8pPr marL="16458377" indent="-1097226" algn="l" defTabSz="4388900" rtl="0" eaLnBrk="1" latinLnBrk="0" hangingPunct="1">
+              <a:spcBef>
+                <a:spcPct val="20000"/>
+              </a:spcBef>
+              <a:buFont typeface="Arial" pitchFamily="34" charset="0"/>
+              <a:buChar char="•"/>
+              <a:defRPr sz="9600" kern="1200">
+                <a:solidFill>
+                  <a:schemeClr val="tx1"/>
+                </a:solidFill>
+                <a:latin typeface="+mn-lt"/>
+                <a:ea typeface="+mn-ea"/>
+                <a:cs typeface="+mn-cs"/>
+              </a:defRPr>
+            </a:lvl8pPr>
+            <a:lvl9pPr marL="18652827" indent="-1097226" algn="l" defTabSz="4388900" rtl="0" eaLnBrk="1" latinLnBrk="0" hangingPunct="1">
+              <a:spcBef>
+                <a:spcPct val="20000"/>
+              </a:spcBef>
+              <a:buFont typeface="Arial" pitchFamily="34" charset="0"/>
+              <a:buChar char="•"/>
+              <a:defRPr sz="9600" kern="1200">
+                <a:solidFill>
+                  <a:schemeClr val="tx1"/>
+                </a:solidFill>
+                <a:latin typeface="+mn-lt"/>
+                <a:ea typeface="+mn-ea"/>
+                <a:cs typeface="+mn-cs"/>
+              </a:defRPr>
+            </a:lvl9pPr>
+          </a:lstStyle>
+          <a:p>
+            <a:r>
+              <a:rPr lang="en-US">
+                <a:solidFill>
+                  <a:schemeClr val="tx2"/>
+                </a:solidFill>
+                <a:latin typeface="Arial" panose="020B0604020202020204" pitchFamily="34" charset="0"/>
+                <a:cs typeface="Arial" panose="020B0604020202020204" pitchFamily="34" charset="0"/>
+              </a:rPr>
+              <a:t>REFERENCES</a:t>
+            </a:r>
+            <a:endParaRPr lang="en-US" dirty="0">
+              <a:solidFill>
+                <a:schemeClr val="tx2"/>
+              </a:solidFill>
+              <a:latin typeface="Arial" panose="020B0604020202020204" pitchFamily="34" charset="0"/>
+              <a:cs typeface="Arial" panose="020B0604020202020204" pitchFamily="34" charset="0"/>
+            </a:endParaRPr>
+          </a:p>
+        </p:txBody>
+      </p:sp>
+      <p:sp>
+        <p:nvSpPr>
+          <p:cNvPr id="48" name="Text Placeholder 7">
+            <a:extLst>
+              <a:ext uri="{FF2B5EF4-FFF2-40B4-BE49-F238E27FC236}">
+                <a16:creationId xmlns:a16="http://schemas.microsoft.com/office/drawing/2014/main" id="{BA9465B5-543A-DA53-34E4-90E2623A05BA}"/>
+              </a:ext>
+            </a:extLst>
+          </p:cNvPr>
+          <p:cNvSpPr txBox="1">
+            <a:spLocks/>
+          </p:cNvSpPr>
+          <p:nvPr/>
+        </p:nvSpPr>
+        <p:spPr>
+          <a:xfrm>
+            <a:off x="33304171" y="5615778"/>
+            <a:ext cx="10058400" cy="800211"/>
+          </a:xfrm>
+          <a:prstGeom prst="rect">
+            <a:avLst/>
+          </a:prstGeom>
+          <a:noFill/>
+        </p:spPr>
+        <p:txBody>
+          <a:bodyPr lIns="91436" tIns="91436" rIns="91436" bIns="91436" anchor="ctr" anchorCtr="0">
+            <a:spAutoFit/>
+          </a:bodyPr>
+          <a:lstStyle>
+            <a:lvl1pPr marL="0" indent="0" algn="ctr" defTabSz="4388900" rtl="0" eaLnBrk="1" latinLnBrk="0" hangingPunct="1">
+              <a:spcBef>
+                <a:spcPct val="20000"/>
+              </a:spcBef>
+              <a:buFont typeface="Arial" pitchFamily="34" charset="0"/>
+              <a:buNone/>
+              <a:defRPr sz="3700" b="1" u="sng" kern="1200" baseline="0">
+                <a:solidFill>
+                  <a:schemeClr val="accent5">
+                    <a:lumMod val="50000"/>
+                  </a:schemeClr>
+                </a:solidFill>
+                <a:latin typeface="+mn-lt"/>
+                <a:ea typeface="+mn-ea"/>
+                <a:cs typeface="+mn-cs"/>
+              </a:defRPr>
+            </a:lvl1pPr>
+            <a:lvl2pPr marL="3565982" indent="-1371531" algn="l" defTabSz="4388900" rtl="0" eaLnBrk="1" latinLnBrk="0" hangingPunct="1">
+              <a:spcBef>
+                <a:spcPct val="20000"/>
+              </a:spcBef>
+              <a:buFont typeface="Arial" pitchFamily="34" charset="0"/>
+              <a:buChar char="–"/>
+              <a:defRPr sz="13500" kern="1200">
+                <a:solidFill>
+                  <a:schemeClr val="tx1"/>
+                </a:solidFill>
+                <a:latin typeface="+mn-lt"/>
+                <a:ea typeface="+mn-ea"/>
+                <a:cs typeface="+mn-cs"/>
+              </a:defRPr>
+            </a:lvl2pPr>
+            <a:lvl3pPr marL="5486126" indent="-1097226" algn="l" defTabSz="4388900" rtl="0" eaLnBrk="1" latinLnBrk="0" hangingPunct="1">
+              <a:spcBef>
+                <a:spcPct val="20000"/>
+              </a:spcBef>
+              <a:buFont typeface="Arial" pitchFamily="34" charset="0"/>
+              <a:buChar char="•"/>
+              <a:defRPr sz="11600" kern="1200">
+                <a:solidFill>
+                  <a:schemeClr val="tx1"/>
+                </a:solidFill>
+                <a:latin typeface="+mn-lt"/>
+                <a:ea typeface="+mn-ea"/>
+                <a:cs typeface="+mn-cs"/>
+              </a:defRPr>
+            </a:lvl3pPr>
+            <a:lvl4pPr marL="7680577" indent="-1097226" algn="l" defTabSz="4388900" rtl="0" eaLnBrk="1" latinLnBrk="0" hangingPunct="1">
+              <a:spcBef>
+                <a:spcPct val="20000"/>
+              </a:spcBef>
+              <a:buFont typeface="Arial" pitchFamily="34" charset="0"/>
+              <a:buChar char="–"/>
+              <a:defRPr sz="9600" kern="1200">
+                <a:solidFill>
+                  <a:schemeClr val="tx1"/>
+                </a:solidFill>
+                <a:latin typeface="+mn-lt"/>
+                <a:ea typeface="+mn-ea"/>
+                <a:cs typeface="+mn-cs"/>
+              </a:defRPr>
+            </a:lvl4pPr>
+            <a:lvl5pPr marL="9875026" indent="-1097226" algn="l" defTabSz="4388900" rtl="0" eaLnBrk="1" latinLnBrk="0" hangingPunct="1">
+              <a:spcBef>
+                <a:spcPct val="20000"/>
+              </a:spcBef>
+              <a:buFont typeface="Arial" pitchFamily="34" charset="0"/>
+              <a:buChar char="»"/>
+              <a:defRPr sz="9600" kern="1200">
+                <a:solidFill>
+                  <a:schemeClr val="tx1"/>
+                </a:solidFill>
+                <a:latin typeface="+mn-lt"/>
+                <a:ea typeface="+mn-ea"/>
+                <a:cs typeface="+mn-cs"/>
+              </a:defRPr>
+            </a:lvl5pPr>
+            <a:lvl6pPr marL="12069477" indent="-1097226" algn="l" defTabSz="4388900" rtl="0" eaLnBrk="1" latinLnBrk="0" hangingPunct="1">
+              <a:spcBef>
+                <a:spcPct val="20000"/>
+              </a:spcBef>
+              <a:buFont typeface="Arial" pitchFamily="34" charset="0"/>
+              <a:buChar char="•"/>
+              <a:defRPr sz="9600" kern="1200">
+                <a:solidFill>
+                  <a:schemeClr val="tx1"/>
+                </a:solidFill>
+                <a:latin typeface="+mn-lt"/>
+                <a:ea typeface="+mn-ea"/>
+                <a:cs typeface="+mn-cs"/>
+              </a:defRPr>
+            </a:lvl6pPr>
+            <a:lvl7pPr marL="14263926" indent="-1097226" algn="l" defTabSz="4388900" rtl="0" eaLnBrk="1" latinLnBrk="0" hangingPunct="1">
+              <a:spcBef>
+                <a:spcPct val="20000"/>
+              </a:spcBef>
+              <a:buFont typeface="Arial" pitchFamily="34" charset="0"/>
+              <a:buChar char="•"/>
+              <a:defRPr sz="9600" kern="1200">
+                <a:solidFill>
+                  <a:schemeClr val="tx1"/>
+                </a:solidFill>
+                <a:latin typeface="+mn-lt"/>
+                <a:ea typeface="+mn-ea"/>
+                <a:cs typeface="+mn-cs"/>
+              </a:defRPr>
+            </a:lvl7pPr>
+            <a:lvl8pPr marL="16458377" indent="-1097226" algn="l" defTabSz="4388900" rtl="0" eaLnBrk="1" latinLnBrk="0" hangingPunct="1">
+              <a:spcBef>
+                <a:spcPct val="20000"/>
+              </a:spcBef>
+              <a:buFont typeface="Arial" pitchFamily="34" charset="0"/>
+              <a:buChar char="•"/>
+              <a:defRPr sz="9600" kern="1200">
+                <a:solidFill>
+                  <a:schemeClr val="tx1"/>
+                </a:solidFill>
+                <a:latin typeface="+mn-lt"/>
+                <a:ea typeface="+mn-ea"/>
+                <a:cs typeface="+mn-cs"/>
+              </a:defRPr>
+            </a:lvl8pPr>
+            <a:lvl9pPr marL="18652827" indent="-1097226" algn="l" defTabSz="4388900" rtl="0" eaLnBrk="1" latinLnBrk="0" hangingPunct="1">
+              <a:spcBef>
+                <a:spcPct val="20000"/>
+              </a:spcBef>
+              <a:buFont typeface="Arial" pitchFamily="34" charset="0"/>
+              <a:buChar char="•"/>
+              <a:defRPr sz="9600" kern="1200">
+                <a:solidFill>
+                  <a:schemeClr val="tx1"/>
+                </a:solidFill>
+                <a:latin typeface="+mn-lt"/>
+                <a:ea typeface="+mn-ea"/>
+                <a:cs typeface="+mn-cs"/>
+              </a:defRPr>
+            </a:lvl9pPr>
+          </a:lstStyle>
+          <a:p>
+            <a:r>
+              <a:rPr lang="en-US" sz="4000" dirty="0">
+                <a:solidFill>
+                  <a:schemeClr val="tx2"/>
+                </a:solidFill>
+                <a:latin typeface="Arial" panose="020B0604020202020204" pitchFamily="34" charset="0"/>
+                <a:cs typeface="Arial" panose="020B0604020202020204" pitchFamily="34" charset="0"/>
+              </a:rPr>
+              <a:t>ARIMA Model</a:t>
+            </a:r>
+          </a:p>
+        </p:txBody>
+      </p:sp>
+      <p:sp>
+        <p:nvSpPr>
+          <p:cNvPr id="49" name="Text Placeholder 20">
+            <a:extLst>
+              <a:ext uri="{FF2B5EF4-FFF2-40B4-BE49-F238E27FC236}">
+                <a16:creationId xmlns:a16="http://schemas.microsoft.com/office/drawing/2014/main" id="{6035398C-2E6F-5FC0-8689-308CC61538FF}"/>
+              </a:ext>
+            </a:extLst>
+          </p:cNvPr>
+          <p:cNvSpPr txBox="1">
+            <a:spLocks/>
+          </p:cNvSpPr>
+          <p:nvPr/>
+        </p:nvSpPr>
+        <p:spPr>
+          <a:xfrm>
+            <a:off x="33468359" y="6280475"/>
+            <a:ext cx="10048874" cy="7774414"/>
+          </a:xfrm>
+          <a:prstGeom prst="rect">
+            <a:avLst/>
+          </a:prstGeom>
+        </p:spPr>
+        <p:txBody>
+          <a:bodyPr wrap="square" lIns="228589" tIns="228589" rIns="228589" bIns="228589">
+            <a:spAutoFit/>
+          </a:bodyPr>
+          <a:lstStyle>
+            <a:lvl1pPr marL="0" indent="0" algn="l" defTabSz="4388900" rtl="0" eaLnBrk="1" latinLnBrk="0" hangingPunct="1">
+              <a:spcBef>
+                <a:spcPct val="20000"/>
+              </a:spcBef>
+              <a:buFont typeface="Arial" pitchFamily="34" charset="0"/>
+              <a:buNone/>
+              <a:defRPr sz="2500" kern="1200">
+                <a:solidFill>
+                  <a:schemeClr val="accent5">
+                    <a:lumMod val="50000"/>
+                  </a:schemeClr>
+                </a:solidFill>
+                <a:latin typeface="Times New Roman" pitchFamily="18" charset="0"/>
+                <a:ea typeface="+mn-ea"/>
+                <a:cs typeface="Times New Roman" pitchFamily="18" charset="0"/>
+              </a:defRPr>
+            </a:lvl1pPr>
+            <a:lvl2pPr marL="1485825" indent="-571471" algn="l" defTabSz="4388900" rtl="0" eaLnBrk="1" latinLnBrk="0" hangingPunct="1">
+              <a:spcBef>
+                <a:spcPct val="20000"/>
+              </a:spcBef>
+              <a:buFont typeface="Arial" pitchFamily="34" charset="0"/>
+              <a:buChar char="–"/>
+              <a:defRPr sz="2500" kern="1200">
+                <a:solidFill>
+                  <a:schemeClr val="tx1"/>
+                </a:solidFill>
+                <a:latin typeface="Trebuchet MS" pitchFamily="34" charset="0"/>
+                <a:ea typeface="+mn-ea"/>
+                <a:cs typeface="+mn-cs"/>
+              </a:defRPr>
+            </a:lvl2pPr>
+            <a:lvl3pPr marL="2057297" indent="-571471" algn="l" defTabSz="4388900" rtl="0" eaLnBrk="1" latinLnBrk="0" hangingPunct="1">
+              <a:spcBef>
+                <a:spcPct val="20000"/>
+              </a:spcBef>
+              <a:buFont typeface="Arial" pitchFamily="34" charset="0"/>
+              <a:buChar char="•"/>
+              <a:defRPr sz="2500" kern="1200">
+                <a:solidFill>
+                  <a:schemeClr val="tx1"/>
+                </a:solidFill>
+                <a:latin typeface="Trebuchet MS" pitchFamily="34" charset="0"/>
+                <a:ea typeface="+mn-ea"/>
+                <a:cs typeface="+mn-cs"/>
+              </a:defRPr>
+            </a:lvl3pPr>
+            <a:lvl4pPr marL="2685916" indent="-628619" algn="l" defTabSz="4388900" rtl="0" eaLnBrk="1" latinLnBrk="0" hangingPunct="1">
+              <a:spcBef>
+                <a:spcPct val="20000"/>
+              </a:spcBef>
+              <a:buFont typeface="Arial" pitchFamily="34" charset="0"/>
+              <a:buChar char="–"/>
+              <a:defRPr sz="2500" kern="1200">
+                <a:solidFill>
+                  <a:schemeClr val="tx1"/>
+                </a:solidFill>
+                <a:latin typeface="Trebuchet MS" pitchFamily="34" charset="0"/>
+                <a:ea typeface="+mn-ea"/>
+                <a:cs typeface="+mn-cs"/>
+              </a:defRPr>
+            </a:lvl4pPr>
+            <a:lvl5pPr marL="3143093" indent="-457177" algn="l" defTabSz="4388900" rtl="0" eaLnBrk="1" latinLnBrk="0" hangingPunct="1">
+              <a:spcBef>
+                <a:spcPct val="20000"/>
+              </a:spcBef>
+              <a:buFont typeface="Arial" pitchFamily="34" charset="0"/>
+              <a:buChar char="»"/>
+              <a:defRPr sz="2500" kern="1200">
+                <a:solidFill>
+                  <a:schemeClr val="tx1"/>
+                </a:solidFill>
+                <a:latin typeface="Trebuchet MS" pitchFamily="34" charset="0"/>
+                <a:ea typeface="+mn-ea"/>
+                <a:cs typeface="+mn-cs"/>
+              </a:defRPr>
+            </a:lvl5pPr>
+            <a:lvl6pPr marL="12069477" indent="-1097226" algn="l" defTabSz="4388900" rtl="0" eaLnBrk="1" latinLnBrk="0" hangingPunct="1">
+              <a:spcBef>
+                <a:spcPct val="20000"/>
+              </a:spcBef>
+              <a:buFont typeface="Arial" pitchFamily="34" charset="0"/>
+              <a:buChar char="•"/>
+              <a:defRPr sz="9600" kern="1200">
+                <a:solidFill>
+                  <a:schemeClr val="tx1"/>
+                </a:solidFill>
+                <a:latin typeface="+mn-lt"/>
+                <a:ea typeface="+mn-ea"/>
+                <a:cs typeface="+mn-cs"/>
+              </a:defRPr>
+            </a:lvl6pPr>
+            <a:lvl7pPr marL="14263926" indent="-1097226" algn="l" defTabSz="4388900" rtl="0" eaLnBrk="1" latinLnBrk="0" hangingPunct="1">
+              <a:spcBef>
+                <a:spcPct val="20000"/>
+              </a:spcBef>
+              <a:buFont typeface="Arial" pitchFamily="34" charset="0"/>
+              <a:buChar char="•"/>
+              <a:defRPr sz="9600" kern="1200">
+                <a:solidFill>
+                  <a:schemeClr val="tx1"/>
+                </a:solidFill>
+                <a:latin typeface="+mn-lt"/>
+                <a:ea typeface="+mn-ea"/>
+                <a:cs typeface="+mn-cs"/>
+              </a:defRPr>
+            </a:lvl7pPr>
+            <a:lvl8pPr marL="16458377" indent="-1097226" algn="l" defTabSz="4388900" rtl="0" eaLnBrk="1" latinLnBrk="0" hangingPunct="1">
+              <a:spcBef>
+                <a:spcPct val="20000"/>
+              </a:spcBef>
+              <a:buFont typeface="Arial" pitchFamily="34" charset="0"/>
+              <a:buChar char="•"/>
+              <a:defRPr sz="9600" kern="1200">
+                <a:solidFill>
+                  <a:schemeClr val="tx1"/>
+                </a:solidFill>
+                <a:latin typeface="+mn-lt"/>
+                <a:ea typeface="+mn-ea"/>
+                <a:cs typeface="+mn-cs"/>
+              </a:defRPr>
+            </a:lvl8pPr>
+            <a:lvl9pPr marL="18652827" indent="-1097226" algn="l" defTabSz="4388900" rtl="0" eaLnBrk="1" latinLnBrk="0" hangingPunct="1">
+              <a:spcBef>
+                <a:spcPct val="20000"/>
+              </a:spcBef>
+              <a:buFont typeface="Arial" pitchFamily="34" charset="0"/>
+              <a:buChar char="•"/>
+              <a:defRPr sz="9600" kern="1200">
+                <a:solidFill>
+                  <a:schemeClr val="tx1"/>
+                </a:solidFill>
+                <a:latin typeface="+mn-lt"/>
+                <a:ea typeface="+mn-ea"/>
+                <a:cs typeface="+mn-cs"/>
+              </a:defRPr>
+            </a:lvl9pPr>
+          </a:lstStyle>
+          <a:p>
+            <a:r>
+              <a:rPr lang="en-IE" sz="3600" dirty="0">
+                <a:solidFill>
+                  <a:schemeClr val="tx1"/>
+                </a:solidFill>
+                <a:latin typeface="+mj-lt"/>
+                <a:cs typeface="Arial" panose="020B0604020202020204" pitchFamily="34" charset="0"/>
+              </a:rPr>
+              <a:t>Using 80-20 training and testing data split. Since the scenario is time specific, we use only continuous data.</a:t>
+            </a:r>
+          </a:p>
+          <a:p>
+            <a:r>
+              <a:rPr lang="en-IE" sz="3600" dirty="0">
+                <a:solidFill>
+                  <a:schemeClr val="tx1"/>
+                </a:solidFill>
+                <a:latin typeface="+mj-lt"/>
+                <a:cs typeface="Arial" panose="020B0604020202020204" pitchFamily="34" charset="0"/>
+              </a:rPr>
+              <a:t>Forecasted data is validated against below metrics and follow results obtained – </a:t>
+            </a:r>
+          </a:p>
+          <a:p>
+            <a:r>
+              <a:rPr lang="en-IE" sz="3600" dirty="0">
+                <a:solidFill>
+                  <a:schemeClr val="tx1"/>
+                </a:solidFill>
+                <a:latin typeface="+mj-lt"/>
+                <a:cs typeface="Arial" panose="020B0604020202020204" pitchFamily="34" charset="0"/>
+              </a:rPr>
+              <a:t>MAE: 328.96</a:t>
+            </a:r>
+          </a:p>
+          <a:p>
+            <a:r>
+              <a:rPr lang="en-IE" sz="3600" dirty="0">
+                <a:solidFill>
+                  <a:schemeClr val="tx1"/>
+                </a:solidFill>
+                <a:latin typeface="+mj-lt"/>
+                <a:cs typeface="Arial" panose="020B0604020202020204" pitchFamily="34" charset="0"/>
+              </a:rPr>
+              <a:t>MSE: 151810.41</a:t>
+            </a:r>
+          </a:p>
+          <a:p>
+            <a:r>
+              <a:rPr lang="en-IE" sz="3600" dirty="0">
+                <a:solidFill>
+                  <a:schemeClr val="tx1"/>
+                </a:solidFill>
+                <a:latin typeface="+mj-lt"/>
+                <a:cs typeface="Arial" panose="020B0604020202020204" pitchFamily="34" charset="0"/>
+              </a:rPr>
+              <a:t>RMSE: 389.63</a:t>
+            </a:r>
+          </a:p>
+          <a:p>
+            <a:r>
+              <a:rPr lang="en-IE" sz="3600" dirty="0">
+                <a:solidFill>
+                  <a:schemeClr val="tx1"/>
+                </a:solidFill>
+                <a:latin typeface="+mj-lt"/>
+                <a:cs typeface="Arial" panose="020B0604020202020204" pitchFamily="34" charset="0"/>
+              </a:rPr>
+              <a:t>MAPE: 16.52%</a:t>
+            </a:r>
+          </a:p>
+          <a:p>
+            <a:r>
+              <a:rPr lang="en-GB" sz="3600" dirty="0">
+                <a:solidFill>
+                  <a:schemeClr val="tx1"/>
+                </a:solidFill>
+                <a:latin typeface="+mj-lt"/>
+                <a:cs typeface="Arial" panose="020B0604020202020204" pitchFamily="34" charset="0"/>
+              </a:rPr>
+              <a:t>ARIMA model can also be implemented with hyperparameters technique by setting values to parameter ‘p’, ‘d’ and ‘q’. </a:t>
+            </a:r>
+          </a:p>
+        </p:txBody>
+      </p:sp>
+      <p:pic>
+        <p:nvPicPr>
+          <p:cNvPr id="50" name="Picture 49" descr="A graph showing the growth of property type&#10;&#10;AI-generated content may be incorrect.">
+            <a:extLst>
+              <a:ext uri="{FF2B5EF4-FFF2-40B4-BE49-F238E27FC236}">
+                <a16:creationId xmlns:a16="http://schemas.microsoft.com/office/drawing/2014/main" id="{ADFEA993-B2FC-ADD7-9597-A684A74CBCD4}"/>
+              </a:ext>
+            </a:extLst>
+          </p:cNvPr>
+          <p:cNvPicPr>
+            <a:picLocks noChangeAspect="1"/>
+          </p:cNvPicPr>
+          <p:nvPr/>
+        </p:nvPicPr>
+        <p:blipFill>
+          <a:blip r:embed="rId8"/>
+          <a:stretch>
+            <a:fillRect/>
+          </a:stretch>
+        </p:blipFill>
+        <p:spPr>
+          <a:xfrm>
+            <a:off x="33759817" y="14287573"/>
+            <a:ext cx="9220269" cy="4335345"/>
+          </a:xfrm>
+          <a:prstGeom prst="rect">
+            <a:avLst/>
+          </a:prstGeom>
+        </p:spPr>
+      </p:pic>
+      <p:sp>
+        <p:nvSpPr>
+          <p:cNvPr id="51" name="Text Placeholder 20">
+            <a:extLst>
+              <a:ext uri="{FF2B5EF4-FFF2-40B4-BE49-F238E27FC236}">
+                <a16:creationId xmlns:a16="http://schemas.microsoft.com/office/drawing/2014/main" id="{AD0734C2-A4A2-FBB2-6211-BC30920BAAFC}"/>
+              </a:ext>
+            </a:extLst>
+          </p:cNvPr>
+          <p:cNvSpPr txBox="1">
+            <a:spLocks/>
+          </p:cNvSpPr>
+          <p:nvPr/>
+        </p:nvSpPr>
+        <p:spPr>
+          <a:xfrm>
+            <a:off x="33621043" y="19576717"/>
+            <a:ext cx="10048874" cy="5558423"/>
+          </a:xfrm>
+          <a:prstGeom prst="rect">
+            <a:avLst/>
+          </a:prstGeom>
+        </p:spPr>
+        <p:txBody>
+          <a:bodyPr wrap="square" lIns="228589" tIns="228589" rIns="228589" bIns="228589">
+            <a:spAutoFit/>
+          </a:bodyPr>
+          <a:lstStyle>
+            <a:lvl1pPr marL="0" indent="0" algn="l" defTabSz="4388900" rtl="0" eaLnBrk="1" latinLnBrk="0" hangingPunct="1">
+              <a:spcBef>
+                <a:spcPct val="20000"/>
+              </a:spcBef>
+              <a:buFont typeface="Arial" pitchFamily="34" charset="0"/>
+              <a:buNone/>
+              <a:defRPr sz="2500" kern="1200">
+                <a:solidFill>
+                  <a:schemeClr val="accent5">
+                    <a:lumMod val="50000"/>
+                  </a:schemeClr>
+                </a:solidFill>
+                <a:latin typeface="Times New Roman" pitchFamily="18" charset="0"/>
+                <a:ea typeface="+mn-ea"/>
+                <a:cs typeface="Times New Roman" pitchFamily="18" charset="0"/>
+              </a:defRPr>
+            </a:lvl1pPr>
+            <a:lvl2pPr marL="1485825" indent="-571471" algn="l" defTabSz="4388900" rtl="0" eaLnBrk="1" latinLnBrk="0" hangingPunct="1">
+              <a:spcBef>
+                <a:spcPct val="20000"/>
+              </a:spcBef>
+              <a:buFont typeface="Arial" pitchFamily="34" charset="0"/>
+              <a:buChar char="–"/>
+              <a:defRPr sz="2500" kern="1200">
+                <a:solidFill>
+                  <a:schemeClr val="tx1"/>
+                </a:solidFill>
+                <a:latin typeface="Trebuchet MS" pitchFamily="34" charset="0"/>
+                <a:ea typeface="+mn-ea"/>
+                <a:cs typeface="+mn-cs"/>
+              </a:defRPr>
+            </a:lvl2pPr>
+            <a:lvl3pPr marL="2057297" indent="-571471" algn="l" defTabSz="4388900" rtl="0" eaLnBrk="1" latinLnBrk="0" hangingPunct="1">
+              <a:spcBef>
+                <a:spcPct val="20000"/>
+              </a:spcBef>
+              <a:buFont typeface="Arial" pitchFamily="34" charset="0"/>
+              <a:buChar char="•"/>
+              <a:defRPr sz="2500" kern="1200">
+                <a:solidFill>
+                  <a:schemeClr val="tx1"/>
+                </a:solidFill>
+                <a:latin typeface="Trebuchet MS" pitchFamily="34" charset="0"/>
+                <a:ea typeface="+mn-ea"/>
+                <a:cs typeface="+mn-cs"/>
+              </a:defRPr>
+            </a:lvl3pPr>
+            <a:lvl4pPr marL="2685916" indent="-628619" algn="l" defTabSz="4388900" rtl="0" eaLnBrk="1" latinLnBrk="0" hangingPunct="1">
+              <a:spcBef>
+                <a:spcPct val="20000"/>
+              </a:spcBef>
+              <a:buFont typeface="Arial" pitchFamily="34" charset="0"/>
+              <a:buChar char="–"/>
+              <a:defRPr sz="2500" kern="1200">
+                <a:solidFill>
+                  <a:schemeClr val="tx1"/>
+                </a:solidFill>
+                <a:latin typeface="Trebuchet MS" pitchFamily="34" charset="0"/>
+                <a:ea typeface="+mn-ea"/>
+                <a:cs typeface="+mn-cs"/>
+              </a:defRPr>
+            </a:lvl4pPr>
+            <a:lvl5pPr marL="3143093" indent="-457177" algn="l" defTabSz="4388900" rtl="0" eaLnBrk="1" latinLnBrk="0" hangingPunct="1">
+              <a:spcBef>
+                <a:spcPct val="20000"/>
+              </a:spcBef>
+              <a:buFont typeface="Arial" pitchFamily="34" charset="0"/>
+              <a:buChar char="»"/>
+              <a:defRPr sz="2500" kern="1200">
+                <a:solidFill>
+                  <a:schemeClr val="tx1"/>
+                </a:solidFill>
+                <a:latin typeface="Trebuchet MS" pitchFamily="34" charset="0"/>
+                <a:ea typeface="+mn-ea"/>
+                <a:cs typeface="+mn-cs"/>
+              </a:defRPr>
+            </a:lvl5pPr>
+            <a:lvl6pPr marL="12069477" indent="-1097226" algn="l" defTabSz="4388900" rtl="0" eaLnBrk="1" latinLnBrk="0" hangingPunct="1">
+              <a:spcBef>
+                <a:spcPct val="20000"/>
+              </a:spcBef>
+              <a:buFont typeface="Arial" pitchFamily="34" charset="0"/>
+              <a:buChar char="•"/>
+              <a:defRPr sz="9600" kern="1200">
+                <a:solidFill>
+                  <a:schemeClr val="tx1"/>
+                </a:solidFill>
+                <a:latin typeface="+mn-lt"/>
+                <a:ea typeface="+mn-ea"/>
+                <a:cs typeface="+mn-cs"/>
+              </a:defRPr>
+            </a:lvl6pPr>
+            <a:lvl7pPr marL="14263926" indent="-1097226" algn="l" defTabSz="4388900" rtl="0" eaLnBrk="1" latinLnBrk="0" hangingPunct="1">
+              <a:spcBef>
+                <a:spcPct val="20000"/>
+              </a:spcBef>
+              <a:buFont typeface="Arial" pitchFamily="34" charset="0"/>
+              <a:buChar char="•"/>
+              <a:defRPr sz="9600" kern="1200">
+                <a:solidFill>
+                  <a:schemeClr val="tx1"/>
+                </a:solidFill>
+                <a:latin typeface="+mn-lt"/>
+                <a:ea typeface="+mn-ea"/>
+                <a:cs typeface="+mn-cs"/>
+              </a:defRPr>
+            </a:lvl7pPr>
+            <a:lvl8pPr marL="16458377" indent="-1097226" algn="l" defTabSz="4388900" rtl="0" eaLnBrk="1" latinLnBrk="0" hangingPunct="1">
+              <a:spcBef>
+                <a:spcPct val="20000"/>
+              </a:spcBef>
+              <a:buFont typeface="Arial" pitchFamily="34" charset="0"/>
+              <a:buChar char="•"/>
+              <a:defRPr sz="9600" kern="1200">
+                <a:solidFill>
+                  <a:schemeClr val="tx1"/>
+                </a:solidFill>
+                <a:latin typeface="+mn-lt"/>
+                <a:ea typeface="+mn-ea"/>
+                <a:cs typeface="+mn-cs"/>
+              </a:defRPr>
+            </a:lvl8pPr>
+            <a:lvl9pPr marL="18652827" indent="-1097226" algn="l" defTabSz="4388900" rtl="0" eaLnBrk="1" latinLnBrk="0" hangingPunct="1">
+              <a:spcBef>
+                <a:spcPct val="20000"/>
+              </a:spcBef>
+              <a:buFont typeface="Arial" pitchFamily="34" charset="0"/>
+              <a:buChar char="•"/>
+              <a:defRPr sz="9600" kern="1200">
+                <a:solidFill>
+                  <a:schemeClr val="tx1"/>
+                </a:solidFill>
+                <a:latin typeface="+mn-lt"/>
+                <a:ea typeface="+mn-ea"/>
+                <a:cs typeface="+mn-cs"/>
+              </a:defRPr>
+            </a:lvl9pPr>
+          </a:lstStyle>
+          <a:p>
+            <a:r>
+              <a:rPr lang="en-GB" sz="3600" dirty="0">
+                <a:solidFill>
+                  <a:schemeClr val="tx1"/>
+                </a:solidFill>
+                <a:latin typeface="+mj-lt"/>
+                <a:cs typeface="Arial" panose="020B0604020202020204" pitchFamily="34" charset="0"/>
+              </a:rPr>
+              <a:t>According to various facts and references discussed above shows there is significant increase in the home rental fares in Dublin during the upcoming quarter. </a:t>
+            </a:r>
+          </a:p>
+          <a:p>
+            <a:r>
+              <a:rPr lang="en-GB" sz="3600" dirty="0">
+                <a:solidFill>
+                  <a:schemeClr val="tx1"/>
+                </a:solidFill>
+                <a:latin typeface="+mj-lt"/>
+                <a:cs typeface="Arial" panose="020B0604020202020204" pitchFamily="34" charset="0"/>
+              </a:rPr>
+              <a:t>Study clearly that the property type ‘Apartment’ has the biggest upward trend in price compared to the other property type. Therefore, we see the strong demand for rental homes will continue in 2025 as well.</a:t>
+            </a:r>
+            <a:endParaRPr lang="en-IE" sz="3600" dirty="0">
+              <a:solidFill>
+                <a:schemeClr val="tx1"/>
+              </a:solidFill>
+              <a:latin typeface="+mj-lt"/>
+              <a:cs typeface="Arial" panose="020B0604020202020204" pitchFamily="34" charset="0"/>
+            </a:endParaRPr>
+          </a:p>
+        </p:txBody>
+      </p:sp>
+      <p:sp>
+        <p:nvSpPr>
+          <p:cNvPr id="54" name="Text Placeholder 20">
+            <a:extLst>
+              <a:ext uri="{FF2B5EF4-FFF2-40B4-BE49-F238E27FC236}">
+                <a16:creationId xmlns:a16="http://schemas.microsoft.com/office/drawing/2014/main" id="{60494290-7F25-4A7D-9C86-54BE907735E1}"/>
+              </a:ext>
+            </a:extLst>
+          </p:cNvPr>
+          <p:cNvSpPr txBox="1">
+            <a:spLocks/>
+          </p:cNvSpPr>
+          <p:nvPr/>
+        </p:nvSpPr>
+        <p:spPr>
+          <a:xfrm>
+            <a:off x="33600529" y="25710394"/>
+            <a:ext cx="10048874" cy="6103380"/>
+          </a:xfrm>
+          <a:prstGeom prst="rect">
+            <a:avLst/>
+          </a:prstGeom>
+        </p:spPr>
+        <p:txBody>
+          <a:bodyPr wrap="square" lIns="228589" tIns="228589" rIns="228589" bIns="228589">
+            <a:spAutoFit/>
+          </a:bodyPr>
+          <a:lstStyle>
+            <a:lvl1pPr marL="0" indent="0" algn="l" defTabSz="4388900" rtl="0" eaLnBrk="1" latinLnBrk="0" hangingPunct="1">
+              <a:spcBef>
+                <a:spcPct val="20000"/>
+              </a:spcBef>
+              <a:buFont typeface="Arial" pitchFamily="34" charset="0"/>
+              <a:buNone/>
+              <a:defRPr sz="2500" kern="1200">
+                <a:solidFill>
+                  <a:schemeClr val="accent5">
+                    <a:lumMod val="50000"/>
+                  </a:schemeClr>
+                </a:solidFill>
+                <a:latin typeface="Times New Roman" pitchFamily="18" charset="0"/>
+                <a:ea typeface="+mn-ea"/>
+                <a:cs typeface="Times New Roman" pitchFamily="18" charset="0"/>
+              </a:defRPr>
+            </a:lvl1pPr>
+            <a:lvl2pPr marL="1485825" indent="-571471" algn="l" defTabSz="4388900" rtl="0" eaLnBrk="1" latinLnBrk="0" hangingPunct="1">
+              <a:spcBef>
+                <a:spcPct val="20000"/>
+              </a:spcBef>
+              <a:buFont typeface="Arial" pitchFamily="34" charset="0"/>
+              <a:buChar char="–"/>
+              <a:defRPr sz="2500" kern="1200">
+                <a:solidFill>
+                  <a:schemeClr val="tx1"/>
+                </a:solidFill>
+                <a:latin typeface="Trebuchet MS" pitchFamily="34" charset="0"/>
+                <a:ea typeface="+mn-ea"/>
+                <a:cs typeface="+mn-cs"/>
+              </a:defRPr>
+            </a:lvl2pPr>
+            <a:lvl3pPr marL="2057297" indent="-571471" algn="l" defTabSz="4388900" rtl="0" eaLnBrk="1" latinLnBrk="0" hangingPunct="1">
+              <a:spcBef>
+                <a:spcPct val="20000"/>
+              </a:spcBef>
+              <a:buFont typeface="Arial" pitchFamily="34" charset="0"/>
+              <a:buChar char="•"/>
+              <a:defRPr sz="2500" kern="1200">
+                <a:solidFill>
+                  <a:schemeClr val="tx1"/>
+                </a:solidFill>
+                <a:latin typeface="Trebuchet MS" pitchFamily="34" charset="0"/>
+                <a:ea typeface="+mn-ea"/>
+                <a:cs typeface="+mn-cs"/>
+              </a:defRPr>
+            </a:lvl3pPr>
+            <a:lvl4pPr marL="2685916" indent="-628619" algn="l" defTabSz="4388900" rtl="0" eaLnBrk="1" latinLnBrk="0" hangingPunct="1">
+              <a:spcBef>
+                <a:spcPct val="20000"/>
+              </a:spcBef>
+              <a:buFont typeface="Arial" pitchFamily="34" charset="0"/>
+              <a:buChar char="–"/>
+              <a:defRPr sz="2500" kern="1200">
+                <a:solidFill>
+                  <a:schemeClr val="tx1"/>
+                </a:solidFill>
+                <a:latin typeface="Trebuchet MS" pitchFamily="34" charset="0"/>
+                <a:ea typeface="+mn-ea"/>
+                <a:cs typeface="+mn-cs"/>
+              </a:defRPr>
+            </a:lvl4pPr>
+            <a:lvl5pPr marL="3143093" indent="-457177" algn="l" defTabSz="4388900" rtl="0" eaLnBrk="1" latinLnBrk="0" hangingPunct="1">
+              <a:spcBef>
+                <a:spcPct val="20000"/>
+              </a:spcBef>
+              <a:buFont typeface="Arial" pitchFamily="34" charset="0"/>
+              <a:buChar char="»"/>
+              <a:defRPr sz="2500" kern="1200">
+                <a:solidFill>
+                  <a:schemeClr val="tx1"/>
+                </a:solidFill>
+                <a:latin typeface="Trebuchet MS" pitchFamily="34" charset="0"/>
+                <a:ea typeface="+mn-ea"/>
+                <a:cs typeface="+mn-cs"/>
+              </a:defRPr>
+            </a:lvl5pPr>
+            <a:lvl6pPr marL="12069477" indent="-1097226" algn="l" defTabSz="4388900" rtl="0" eaLnBrk="1" latinLnBrk="0" hangingPunct="1">
+              <a:spcBef>
+                <a:spcPct val="20000"/>
+              </a:spcBef>
+              <a:buFont typeface="Arial" pitchFamily="34" charset="0"/>
+              <a:buChar char="•"/>
+              <a:defRPr sz="9600" kern="1200">
+                <a:solidFill>
+                  <a:schemeClr val="tx1"/>
+                </a:solidFill>
+                <a:latin typeface="+mn-lt"/>
+                <a:ea typeface="+mn-ea"/>
+                <a:cs typeface="+mn-cs"/>
+              </a:defRPr>
+            </a:lvl6pPr>
+            <a:lvl7pPr marL="14263926" indent="-1097226" algn="l" defTabSz="4388900" rtl="0" eaLnBrk="1" latinLnBrk="0" hangingPunct="1">
+              <a:spcBef>
+                <a:spcPct val="20000"/>
+              </a:spcBef>
+              <a:buFont typeface="Arial" pitchFamily="34" charset="0"/>
+              <a:buChar char="•"/>
+              <a:defRPr sz="9600" kern="1200">
+                <a:solidFill>
+                  <a:schemeClr val="tx1"/>
+                </a:solidFill>
+                <a:latin typeface="+mn-lt"/>
+                <a:ea typeface="+mn-ea"/>
+                <a:cs typeface="+mn-cs"/>
+              </a:defRPr>
+            </a:lvl7pPr>
+            <a:lvl8pPr marL="16458377" indent="-1097226" algn="l" defTabSz="4388900" rtl="0" eaLnBrk="1" latinLnBrk="0" hangingPunct="1">
+              <a:spcBef>
+                <a:spcPct val="20000"/>
+              </a:spcBef>
+              <a:buFont typeface="Arial" pitchFamily="34" charset="0"/>
+              <a:buChar char="•"/>
+              <a:defRPr sz="9600" kern="1200">
+                <a:solidFill>
+                  <a:schemeClr val="tx1"/>
+                </a:solidFill>
+                <a:latin typeface="+mn-lt"/>
+                <a:ea typeface="+mn-ea"/>
+                <a:cs typeface="+mn-cs"/>
+              </a:defRPr>
+            </a:lvl8pPr>
+            <a:lvl9pPr marL="18652827" indent="-1097226" algn="l" defTabSz="4388900" rtl="0" eaLnBrk="1" latinLnBrk="0" hangingPunct="1">
+              <a:spcBef>
+                <a:spcPct val="20000"/>
+              </a:spcBef>
+              <a:buFont typeface="Arial" pitchFamily="34" charset="0"/>
+              <a:buChar char="•"/>
+              <a:defRPr sz="9600" kern="1200">
+                <a:solidFill>
+                  <a:schemeClr val="tx1"/>
+                </a:solidFill>
+                <a:latin typeface="+mn-lt"/>
+                <a:ea typeface="+mn-ea"/>
+                <a:cs typeface="+mn-cs"/>
+              </a:defRPr>
+            </a:lvl9pPr>
+          </a:lstStyle>
+          <a:p>
+            <a:pPr>
+              <a:lnSpc>
+                <a:spcPct val="107000"/>
+              </a:lnSpc>
+              <a:spcAft>
+                <a:spcPts val="800"/>
+              </a:spcAft>
+              <a:buNone/>
+            </a:pPr>
+            <a:r>
+              <a:rPr lang="en-IE" sz="1600" u="sng" kern="0" dirty="0">
+                <a:solidFill>
+                  <a:srgbClr val="467886"/>
+                </a:solidFill>
+                <a:effectLst/>
+                <a:latin typeface="+mn-lt"/>
+                <a:ea typeface="Times New Roman" panose="02020603050405020304" pitchFamily="18" charset="0"/>
+                <a:cs typeface="Calibri" panose="020F0502020204030204" pitchFamily="34" charset="0"/>
+              </a:rPr>
+              <a:t>(IPOA and IPAV)</a:t>
+            </a:r>
+            <a:r>
+              <a:rPr lang="en-IE" sz="1600" u="sng" kern="100" dirty="0">
+                <a:solidFill>
+                  <a:srgbClr val="467886"/>
+                </a:solidFill>
+                <a:latin typeface="+mn-lt"/>
+                <a:ea typeface="Times New Roman" panose="02020603050405020304" pitchFamily="18" charset="0"/>
+                <a:cs typeface="Latha" panose="020B0604020202020204" pitchFamily="34" charset="0"/>
+              </a:rPr>
+              <a:t> - </a:t>
+            </a:r>
+            <a:r>
+              <a:rPr lang="en-IE" sz="1600" dirty="0">
+                <a:effectLst/>
+                <a:latin typeface="+mn-lt"/>
+                <a:ea typeface="Times New Roman" panose="02020603050405020304" pitchFamily="18" charset="0"/>
+              </a:rPr>
+              <a:t>POA, and IPAV. </a:t>
+            </a:r>
+            <a:r>
+              <a:rPr lang="en-IE" sz="1600" i="1" dirty="0">
+                <a:effectLst/>
+                <a:latin typeface="+mn-lt"/>
+                <a:ea typeface="Times New Roman" panose="02020603050405020304" pitchFamily="18" charset="0"/>
+              </a:rPr>
+              <a:t>THE IRISH PRIVATE RENTAL MARKET</a:t>
+            </a:r>
+            <a:r>
+              <a:rPr lang="en-IE" sz="1600" dirty="0">
+                <a:effectLst/>
+                <a:latin typeface="+mn-lt"/>
+                <a:ea typeface="Times New Roman" panose="02020603050405020304" pitchFamily="18" charset="0"/>
+              </a:rPr>
+              <a:t>. IPAV.ie, June 2022.</a:t>
+            </a:r>
+            <a:br>
+              <a:rPr lang="en-IE" sz="1600" dirty="0">
+                <a:latin typeface="+mn-lt"/>
+                <a:ea typeface="Times New Roman" panose="02020603050405020304" pitchFamily="18" charset="0"/>
+              </a:rPr>
+            </a:br>
+            <a:r>
+              <a:rPr lang="en-IE" sz="1600" kern="100" dirty="0">
+                <a:effectLst/>
+                <a:latin typeface="+mn-lt"/>
+                <a:ea typeface="Aptos" panose="020B0004020202020204" pitchFamily="34" charset="0"/>
+                <a:cs typeface="Latha" panose="020B0604020202020204" pitchFamily="34" charset="0"/>
+              </a:rPr>
+              <a:t>Available at: </a:t>
+            </a:r>
+            <a:r>
+              <a:rPr lang="en-IE" sz="1600" u="sng" kern="100" dirty="0">
+                <a:solidFill>
+                  <a:srgbClr val="467886"/>
+                </a:solidFill>
+                <a:effectLst/>
+                <a:latin typeface="+mn-lt"/>
+                <a:ea typeface="Aptos" panose="020B0004020202020204" pitchFamily="34" charset="0"/>
+                <a:cs typeface="Latha" panose="020B0604020202020204" pitchFamily="34" charset="0"/>
+                <a:hlinkClick r:id="rId9"/>
+              </a:rPr>
+              <a:t>https://www.ipav.ie/sites/default/files/ipav_ipoa_jim_power_updated_report_june_2022.pdf</a:t>
+            </a:r>
+            <a:endParaRPr lang="en-IE" sz="1600" kern="100" dirty="0">
+              <a:effectLst/>
+              <a:latin typeface="+mn-lt"/>
+              <a:ea typeface="Aptos" panose="020B0004020202020204" pitchFamily="34" charset="0"/>
+              <a:cs typeface="Latha" panose="020B0604020202020204" pitchFamily="34" charset="0"/>
+            </a:endParaRPr>
+          </a:p>
+          <a:p>
+            <a:pPr>
+              <a:lnSpc>
+                <a:spcPct val="107000"/>
+              </a:lnSpc>
+              <a:spcAft>
+                <a:spcPts val="800"/>
+              </a:spcAft>
+              <a:buNone/>
+            </a:pPr>
+            <a:r>
+              <a:rPr lang="en-IE" sz="1600" kern="0" dirty="0">
+                <a:effectLst/>
+                <a:latin typeface="+mn-lt"/>
+                <a:ea typeface="Times New Roman" panose="02020603050405020304" pitchFamily="18" charset="0"/>
+                <a:cs typeface="Latha" panose="020B0604020202020204" pitchFamily="34" charset="0"/>
+              </a:rPr>
+              <a:t> </a:t>
+            </a:r>
+            <a:r>
+              <a:rPr lang="en-IE" sz="1600" kern="0" dirty="0">
+                <a:effectLst/>
+                <a:latin typeface="+mn-lt"/>
+                <a:ea typeface="Times New Roman" panose="02020603050405020304" pitchFamily="18" charset="0"/>
+                <a:cs typeface="Calibri" panose="020F0502020204030204" pitchFamily="34" charset="0"/>
+              </a:rPr>
+              <a:t>(Hotz) - Hotz, Nick. “What Is CRISP DM?” Data Science Project Management, 2024,</a:t>
+            </a:r>
+            <a:r>
+              <a:rPr lang="en-IE" sz="1600" kern="100" dirty="0">
+                <a:effectLst/>
+                <a:latin typeface="+mn-lt"/>
+                <a:ea typeface="Aptos" panose="020B0004020202020204" pitchFamily="34" charset="0"/>
+                <a:cs typeface="Latha" panose="020B0604020202020204" pitchFamily="34" charset="0"/>
+              </a:rPr>
+              <a:t> </a:t>
+            </a:r>
+            <a:br>
+              <a:rPr lang="en-IE" sz="1600" kern="100" dirty="0">
+                <a:effectLst/>
+                <a:latin typeface="+mn-lt"/>
+                <a:ea typeface="Aptos" panose="020B0004020202020204" pitchFamily="34" charset="0"/>
+                <a:cs typeface="Latha" panose="020B0604020202020204" pitchFamily="34" charset="0"/>
+              </a:rPr>
+            </a:br>
+            <a:r>
+              <a:rPr lang="en-IE" sz="1600" kern="100" dirty="0">
+                <a:effectLst/>
+                <a:latin typeface="+mn-lt"/>
+                <a:ea typeface="Aptos" panose="020B0004020202020204" pitchFamily="34" charset="0"/>
+                <a:cs typeface="Latha" panose="020B0604020202020204" pitchFamily="34" charset="0"/>
+              </a:rPr>
+              <a:t>Available at: </a:t>
+            </a:r>
+            <a:r>
+              <a:rPr lang="en-IE" sz="1600" u="sng" kern="100" dirty="0">
+                <a:solidFill>
+                  <a:srgbClr val="467886"/>
+                </a:solidFill>
+                <a:effectLst/>
+                <a:latin typeface="+mn-lt"/>
+                <a:ea typeface="Aptos" panose="020B0004020202020204" pitchFamily="34" charset="0"/>
+                <a:cs typeface="Latha" panose="020B0604020202020204" pitchFamily="34" charset="0"/>
+                <a:hlinkClick r:id="rId10"/>
+              </a:rPr>
+              <a:t>www.datascience-pm.com/crisp-dm-2/</a:t>
+            </a:r>
+            <a:r>
+              <a:rPr lang="en-IE" sz="1600" kern="100" dirty="0">
+                <a:effectLst/>
+                <a:latin typeface="+mn-lt"/>
+                <a:ea typeface="Aptos" panose="020B0004020202020204" pitchFamily="34" charset="0"/>
+                <a:cs typeface="Latha" panose="020B0604020202020204" pitchFamily="34" charset="0"/>
+              </a:rPr>
+              <a:t>.</a:t>
+            </a:r>
+          </a:p>
+          <a:p>
+            <a:pPr>
+              <a:lnSpc>
+                <a:spcPct val="107000"/>
+              </a:lnSpc>
+              <a:spcAft>
+                <a:spcPts val="800"/>
+              </a:spcAft>
+              <a:buNone/>
+            </a:pPr>
+            <a:r>
+              <a:rPr lang="en-IE" sz="1600" kern="0" dirty="0">
+                <a:effectLst/>
+                <a:latin typeface="+mn-lt"/>
+                <a:ea typeface="Times New Roman" panose="02020603050405020304" pitchFamily="18" charset="0"/>
+                <a:cs typeface="Calibri" panose="020F0502020204030204" pitchFamily="34" charset="0"/>
+              </a:rPr>
+              <a:t>(Data Science PM) - </a:t>
+            </a:r>
+            <a:r>
+              <a:rPr lang="en-IE" sz="1600" dirty="0">
+                <a:effectLst/>
+                <a:latin typeface="+mn-lt"/>
+                <a:ea typeface="Times New Roman" panose="02020603050405020304" pitchFamily="18" charset="0"/>
+              </a:rPr>
+              <a:t>Data Science PM. “What Is CRISP DM?” Data Science Project Management, 9 Dec. 2024,</a:t>
+            </a:r>
+            <a:br>
+              <a:rPr lang="en-IE" sz="1600" dirty="0">
+                <a:latin typeface="+mn-lt"/>
+                <a:ea typeface="Times New Roman" panose="02020603050405020304" pitchFamily="18" charset="0"/>
+              </a:rPr>
+            </a:br>
+            <a:r>
+              <a:rPr lang="en-IE" sz="1600" kern="100" dirty="0">
+                <a:effectLst/>
+                <a:latin typeface="+mn-lt"/>
+                <a:ea typeface="Aptos" panose="020B0004020202020204" pitchFamily="34" charset="0"/>
+                <a:cs typeface="Calibri" panose="020F0502020204030204" pitchFamily="34" charset="0"/>
+              </a:rPr>
+              <a:t>Available at:  </a:t>
+            </a:r>
+            <a:r>
+              <a:rPr lang="en-IE" sz="1600" u="sng" kern="100" dirty="0">
+                <a:solidFill>
+                  <a:srgbClr val="467886"/>
+                </a:solidFill>
+                <a:effectLst/>
+                <a:latin typeface="+mn-lt"/>
+                <a:ea typeface="Aptos" panose="020B0004020202020204" pitchFamily="34" charset="0"/>
+                <a:cs typeface="Calibri" panose="020F0502020204030204" pitchFamily="34" charset="0"/>
+                <a:hlinkClick r:id="rId11"/>
+              </a:rPr>
+              <a:t>https://www.datascience-pm.com/crisp-dm-2/</a:t>
+            </a:r>
+            <a:endParaRPr lang="en-IE" sz="1600" u="sng" kern="100" dirty="0">
+              <a:solidFill>
+                <a:srgbClr val="467886"/>
+              </a:solidFill>
+              <a:latin typeface="+mn-lt"/>
+              <a:ea typeface="Aptos" panose="020B0004020202020204" pitchFamily="34" charset="0"/>
+              <a:cs typeface="Latha" panose="020B0604020202020204" pitchFamily="34" charset="0"/>
+            </a:endParaRPr>
+          </a:p>
+          <a:p>
+            <a:pPr>
+              <a:lnSpc>
+                <a:spcPct val="107000"/>
+              </a:lnSpc>
+              <a:spcAft>
+                <a:spcPts val="800"/>
+              </a:spcAft>
+              <a:buNone/>
+            </a:pPr>
+            <a:r>
+              <a:rPr lang="en-IE" sz="1600" kern="100" dirty="0">
+                <a:effectLst/>
+                <a:latin typeface="+mn-lt"/>
+                <a:ea typeface="Aptos" panose="020B0004020202020204" pitchFamily="34" charset="0"/>
+                <a:cs typeface="Latha" panose="020B0604020202020204" pitchFamily="34" charset="0"/>
+              </a:rPr>
+              <a:t>(Simplilearn)  - </a:t>
+            </a:r>
+            <a:r>
+              <a:rPr lang="en-IE" sz="1600" dirty="0">
+                <a:effectLst/>
+                <a:latin typeface="+mn-lt"/>
+                <a:ea typeface="Times New Roman" panose="02020603050405020304" pitchFamily="18" charset="0"/>
+              </a:rPr>
+              <a:t>Simplilearn. “The Ultimate Guide to Cross Validation in Machine Learning for 2021.” </a:t>
+            </a:r>
+            <a:r>
+              <a:rPr lang="en-IE" sz="1600" i="1" dirty="0">
+                <a:effectLst/>
+                <a:latin typeface="+mn-lt"/>
+                <a:ea typeface="Times New Roman" panose="02020603050405020304" pitchFamily="18" charset="0"/>
+              </a:rPr>
+              <a:t>Simplilearn.com</a:t>
+            </a:r>
+            <a:r>
+              <a:rPr lang="en-IE" sz="1600" dirty="0">
+                <a:effectLst/>
+                <a:latin typeface="+mn-lt"/>
+                <a:ea typeface="Times New Roman" panose="02020603050405020304" pitchFamily="18" charset="0"/>
+              </a:rPr>
+              <a:t>, 18 Mar. 2024, www.simplilearn.com/tutorials/machine-learning-tutorial/cross-validation.</a:t>
+            </a:r>
+            <a:br>
+              <a:rPr lang="en-IE" sz="1600" dirty="0">
+                <a:effectLst/>
+                <a:latin typeface="+mn-lt"/>
+                <a:ea typeface="Times New Roman" panose="02020603050405020304" pitchFamily="18" charset="0"/>
+              </a:rPr>
+            </a:br>
+            <a:r>
+              <a:rPr lang="en-IE" sz="1600" kern="100" dirty="0">
+                <a:effectLst/>
+                <a:latin typeface="+mn-lt"/>
+                <a:ea typeface="Aptos" panose="020B0004020202020204" pitchFamily="34" charset="0"/>
+                <a:cs typeface="Latha" panose="020B0604020202020204" pitchFamily="34" charset="0"/>
+              </a:rPr>
+              <a:t>Available at: </a:t>
+            </a:r>
+            <a:r>
+              <a:rPr lang="en-IE" sz="1600" u="sng" kern="100" dirty="0">
+                <a:solidFill>
+                  <a:srgbClr val="467886"/>
+                </a:solidFill>
+                <a:effectLst/>
+                <a:latin typeface="+mn-lt"/>
+                <a:ea typeface="Aptos" panose="020B0004020202020204" pitchFamily="34" charset="0"/>
+                <a:cs typeface="Latha" panose="020B0604020202020204" pitchFamily="34" charset="0"/>
+                <a:hlinkClick r:id="rId12"/>
+              </a:rPr>
+              <a:t>https://www.simplilearn.com/tutorials/machine-learning-tutorial/cross-validation</a:t>
+            </a:r>
+            <a:endParaRPr lang="en-IE" sz="1600" u="sng" kern="100" dirty="0">
+              <a:solidFill>
+                <a:srgbClr val="467886"/>
+              </a:solidFill>
+              <a:latin typeface="+mn-lt"/>
+              <a:ea typeface="Aptos" panose="020B0004020202020204" pitchFamily="34" charset="0"/>
+              <a:cs typeface="Latha" panose="020B0604020202020204" pitchFamily="34" charset="0"/>
+            </a:endParaRPr>
+          </a:p>
+          <a:p>
+            <a:pPr>
+              <a:lnSpc>
+                <a:spcPct val="107000"/>
+              </a:lnSpc>
+              <a:spcAft>
+                <a:spcPts val="800"/>
+              </a:spcAft>
+              <a:buNone/>
+            </a:pPr>
+            <a:r>
+              <a:rPr lang="en-IE" sz="1600" kern="100" dirty="0">
+                <a:effectLst/>
+                <a:latin typeface="+mn-lt"/>
+                <a:ea typeface="Aptos" panose="020B0004020202020204" pitchFamily="34" charset="0"/>
+                <a:cs typeface="Latha" panose="020B0604020202020204" pitchFamily="34" charset="0"/>
+              </a:rPr>
+              <a:t>(Rowe) - </a:t>
+            </a:r>
+            <a:r>
+              <a:rPr lang="en-IE" sz="1600" dirty="0">
+                <a:effectLst/>
+                <a:latin typeface="+mn-lt"/>
+                <a:ea typeface="Times New Roman" panose="02020603050405020304" pitchFamily="18" charset="0"/>
+              </a:rPr>
+              <a:t>Rowe, Walker. “Mean Squared Error, R2, and Variance in Regression Analysis.” </a:t>
+            </a:r>
+            <a:r>
+              <a:rPr lang="en-IE" sz="1600" i="1" dirty="0">
+                <a:effectLst/>
+                <a:latin typeface="+mn-lt"/>
+                <a:ea typeface="Times New Roman" panose="02020603050405020304" pitchFamily="18" charset="0"/>
+              </a:rPr>
+              <a:t>BMC Blogs</a:t>
+            </a:r>
+            <a:r>
+              <a:rPr lang="en-IE" sz="1600" dirty="0">
+                <a:effectLst/>
+                <a:latin typeface="+mn-lt"/>
+                <a:ea typeface="Times New Roman" panose="02020603050405020304" pitchFamily="18" charset="0"/>
+              </a:rPr>
+              <a:t>, 2018, </a:t>
+            </a:r>
+            <a:r>
+              <a:rPr lang="en-IE" sz="1600" u="sng" dirty="0">
+                <a:solidFill>
+                  <a:srgbClr val="467886"/>
+                </a:solidFill>
+                <a:effectLst/>
+                <a:latin typeface="+mn-lt"/>
+                <a:ea typeface="Times New Roman" panose="02020603050405020304" pitchFamily="18" charset="0"/>
+                <a:hlinkClick r:id="rId13"/>
+              </a:rPr>
+              <a:t>www.bmc.com/blogs/mean-squared-error-r2-and-variance-in-regression-analysis/</a:t>
+            </a:r>
+            <a:r>
+              <a:rPr lang="en-IE" sz="1600" dirty="0">
+                <a:effectLst/>
+                <a:latin typeface="+mn-lt"/>
+                <a:ea typeface="Times New Roman" panose="02020603050405020304" pitchFamily="18" charset="0"/>
+              </a:rPr>
+              <a:t>.</a:t>
+            </a:r>
+            <a:br>
+              <a:rPr lang="en-IE" sz="1600" dirty="0">
+                <a:effectLst/>
+                <a:latin typeface="+mn-lt"/>
+                <a:ea typeface="Times New Roman" panose="02020603050405020304" pitchFamily="18" charset="0"/>
+              </a:rPr>
+            </a:br>
+            <a:r>
+              <a:rPr lang="en-IE" sz="1600" kern="100" dirty="0">
+                <a:effectLst/>
+                <a:latin typeface="+mn-lt"/>
+                <a:ea typeface="Aptos" panose="020B0004020202020204" pitchFamily="34" charset="0"/>
+                <a:cs typeface="Latha" panose="020B0604020202020204" pitchFamily="34" charset="0"/>
+              </a:rPr>
+              <a:t>Available at: </a:t>
+            </a:r>
+            <a:r>
+              <a:rPr lang="en-IE" sz="1600" u="sng" kern="100" dirty="0">
+                <a:solidFill>
+                  <a:srgbClr val="467886"/>
+                </a:solidFill>
+                <a:effectLst/>
+                <a:latin typeface="+mn-lt"/>
+                <a:ea typeface="Aptos" panose="020B0004020202020204" pitchFamily="34" charset="0"/>
+                <a:cs typeface="Latha" panose="020B0604020202020204" pitchFamily="34" charset="0"/>
+                <a:hlinkClick r:id="rId14"/>
+              </a:rPr>
+              <a:t>https://www.bmc.com/blogs/mean-squared-error-r2-and-variance-in-regression-analysis/</a:t>
+            </a:r>
+            <a:endParaRPr lang="en-IE" sz="1600" u="sng" kern="100" dirty="0">
+              <a:solidFill>
+                <a:srgbClr val="467886"/>
+              </a:solidFill>
+              <a:latin typeface="+mn-lt"/>
+              <a:ea typeface="Aptos" panose="020B0004020202020204" pitchFamily="34" charset="0"/>
+              <a:cs typeface="Latha" panose="020B0604020202020204" pitchFamily="34" charset="0"/>
+            </a:endParaRPr>
+          </a:p>
+          <a:p>
+            <a:pPr>
+              <a:lnSpc>
+                <a:spcPct val="107000"/>
+              </a:lnSpc>
+              <a:spcAft>
+                <a:spcPts val="800"/>
+              </a:spcAft>
+              <a:buNone/>
+            </a:pPr>
+            <a:r>
+              <a:rPr lang="en-IE" sz="1600" kern="100" dirty="0">
+                <a:effectLst/>
+                <a:latin typeface="+mn-lt"/>
+                <a:ea typeface="Aptos" panose="020B0004020202020204" pitchFamily="34" charset="0"/>
+                <a:cs typeface="Latha" panose="020B0604020202020204" pitchFamily="34" charset="0"/>
+              </a:rPr>
+              <a:t>(Shah) - </a:t>
+            </a:r>
+            <a:r>
+              <a:rPr lang="en-IE" sz="1600" dirty="0">
+                <a:effectLst/>
+                <a:latin typeface="+mn-lt"/>
+                <a:ea typeface="Times New Roman" panose="02020603050405020304" pitchFamily="18" charset="0"/>
+              </a:rPr>
+              <a:t>Shah, Rahul. “</a:t>
+            </a:r>
+            <a:r>
+              <a:rPr lang="en-IE" sz="1600" dirty="0" err="1">
+                <a:effectLst/>
+                <a:latin typeface="+mn-lt"/>
+                <a:ea typeface="Times New Roman" panose="02020603050405020304" pitchFamily="18" charset="0"/>
+              </a:rPr>
+              <a:t>GridSearchCV</a:t>
+            </a:r>
+            <a:r>
+              <a:rPr lang="en-IE" sz="1600" dirty="0">
+                <a:effectLst/>
+                <a:latin typeface="+mn-lt"/>
+                <a:ea typeface="Times New Roman" panose="02020603050405020304" pitchFamily="18" charset="0"/>
+              </a:rPr>
+              <a:t> |Tune Hyperparameters with </a:t>
+            </a:r>
+            <a:r>
+              <a:rPr lang="en-IE" sz="1600" dirty="0" err="1">
+                <a:effectLst/>
+                <a:latin typeface="+mn-lt"/>
+                <a:ea typeface="Times New Roman" panose="02020603050405020304" pitchFamily="18" charset="0"/>
+              </a:rPr>
+              <a:t>GridSearchCV</a:t>
+            </a:r>
+            <a:r>
+              <a:rPr lang="en-IE" sz="1600" dirty="0">
+                <a:effectLst/>
+                <a:latin typeface="+mn-lt"/>
+                <a:ea typeface="Times New Roman" panose="02020603050405020304" pitchFamily="18" charset="0"/>
+              </a:rPr>
+              <a:t>.” </a:t>
+            </a:r>
+            <a:r>
+              <a:rPr lang="en-IE" sz="1600" i="1" dirty="0">
+                <a:effectLst/>
+                <a:latin typeface="+mn-lt"/>
+                <a:ea typeface="Times New Roman" panose="02020603050405020304" pitchFamily="18" charset="0"/>
+              </a:rPr>
+              <a:t>Analytics Vidhya</a:t>
+            </a:r>
+            <a:r>
+              <a:rPr lang="en-IE" sz="1600" dirty="0">
+                <a:effectLst/>
+                <a:latin typeface="+mn-lt"/>
+                <a:ea typeface="Times New Roman" panose="02020603050405020304" pitchFamily="18" charset="0"/>
+              </a:rPr>
+              <a:t>, 23 June 2021, www.analyticsvidhya.com/blog/2021/06/tune-hyperparameters-with-gridsearchcv/.</a:t>
+            </a:r>
+            <a:br>
+              <a:rPr lang="en-IE" sz="1600" dirty="0">
+                <a:effectLst/>
+                <a:latin typeface="+mn-lt"/>
+                <a:ea typeface="Times New Roman" panose="02020603050405020304" pitchFamily="18" charset="0"/>
+              </a:rPr>
+            </a:br>
+            <a:r>
+              <a:rPr lang="en-IE" sz="1600" dirty="0">
+                <a:effectLst/>
+                <a:latin typeface="+mn-lt"/>
+                <a:ea typeface="Times New Roman" panose="02020603050405020304" pitchFamily="18" charset="0"/>
+              </a:rPr>
+              <a:t>Available at: </a:t>
+            </a:r>
+            <a:r>
+              <a:rPr lang="en-IE" sz="1600" u="sng" dirty="0">
+                <a:solidFill>
+                  <a:srgbClr val="467886"/>
+                </a:solidFill>
+                <a:effectLst/>
+                <a:latin typeface="+mn-lt"/>
+                <a:ea typeface="Times New Roman" panose="02020603050405020304" pitchFamily="18" charset="0"/>
+                <a:hlinkClick r:id="rId15"/>
+              </a:rPr>
+              <a:t>https://www.analyticsvidhya.com/blog/2021/06/tune-hyperparameters-with-gridsearchcv/</a:t>
+            </a:r>
+            <a:endParaRPr lang="en-IE" sz="1600" u="sng" dirty="0">
+              <a:solidFill>
+                <a:srgbClr val="467886"/>
+              </a:solidFill>
+              <a:latin typeface="+mn-lt"/>
+              <a:ea typeface="Times New Roman" panose="02020603050405020304" pitchFamily="18" charset="0"/>
+            </a:endParaRPr>
+          </a:p>
+          <a:p>
+            <a:pPr>
+              <a:lnSpc>
+                <a:spcPct val="107000"/>
+              </a:lnSpc>
+              <a:spcAft>
+                <a:spcPts val="800"/>
+              </a:spcAft>
+              <a:buNone/>
+            </a:pPr>
+            <a:r>
+              <a:rPr lang="en-IE" sz="1600" kern="0" dirty="0">
+                <a:effectLst/>
+                <a:latin typeface="+mn-lt"/>
+                <a:ea typeface="Times New Roman" panose="02020603050405020304" pitchFamily="18" charset="0"/>
+                <a:cs typeface="Latha" panose="020B0604020202020204" pitchFamily="34" charset="0"/>
+              </a:rPr>
+              <a:t>(IBM)</a:t>
+            </a:r>
+            <a:r>
+              <a:rPr lang="en-IE" sz="1600" kern="100" dirty="0">
+                <a:latin typeface="+mn-lt"/>
+                <a:ea typeface="Times New Roman" panose="02020603050405020304" pitchFamily="18" charset="0"/>
+                <a:cs typeface="Latha" panose="020B0604020202020204" pitchFamily="34" charset="0"/>
+              </a:rPr>
+              <a:t> - </a:t>
+            </a:r>
+            <a:r>
+              <a:rPr lang="en-IE" sz="1600" dirty="0">
+                <a:effectLst/>
+                <a:latin typeface="+mn-lt"/>
+                <a:ea typeface="Times New Roman" panose="02020603050405020304" pitchFamily="18" charset="0"/>
+              </a:rPr>
+              <a:t>IBM, IBM. “IBM Cognos Analytics 12.0.x.” </a:t>
+            </a:r>
+            <a:r>
+              <a:rPr lang="en-IE" sz="1600" i="1" dirty="0">
+                <a:effectLst/>
+                <a:latin typeface="+mn-lt"/>
+                <a:ea typeface="Times New Roman" panose="02020603050405020304" pitchFamily="18" charset="0"/>
+              </a:rPr>
+              <a:t>Ibm.com</a:t>
+            </a:r>
+            <a:r>
+              <a:rPr lang="en-IE" sz="1600" dirty="0">
+                <a:effectLst/>
+                <a:latin typeface="+mn-lt"/>
+                <a:ea typeface="Times New Roman" panose="02020603050405020304" pitchFamily="18" charset="0"/>
+              </a:rPr>
+              <a:t>, 18 Jan. 2024, www.ibm.com/docs/en/cognos-analytics/12.0.0?topic=forecasting-statistical-details.</a:t>
+            </a:r>
+            <a:br>
+              <a:rPr lang="en-IE" sz="1600" dirty="0">
+                <a:effectLst/>
+                <a:latin typeface="+mn-lt"/>
+                <a:ea typeface="Times New Roman" panose="02020603050405020304" pitchFamily="18" charset="0"/>
+              </a:rPr>
+            </a:br>
+            <a:r>
+              <a:rPr lang="en-IE" sz="1600" kern="100" dirty="0">
+                <a:effectLst/>
+                <a:latin typeface="+mn-lt"/>
+                <a:ea typeface="Aptos" panose="020B0004020202020204" pitchFamily="34" charset="0"/>
+                <a:cs typeface="Latha" panose="020B0604020202020204" pitchFamily="34" charset="0"/>
+              </a:rPr>
+              <a:t>Available at: </a:t>
+            </a:r>
+            <a:r>
+              <a:rPr lang="en-IE" sz="1600" u="sng" kern="100" dirty="0">
+                <a:solidFill>
+                  <a:srgbClr val="467886"/>
+                </a:solidFill>
+                <a:effectLst/>
+                <a:latin typeface="+mn-lt"/>
+                <a:ea typeface="Aptos" panose="020B0004020202020204" pitchFamily="34" charset="0"/>
+                <a:cs typeface="Latha" panose="020B0604020202020204" pitchFamily="34" charset="0"/>
+                <a:hlinkClick r:id="rId16"/>
+              </a:rPr>
+              <a:t>https://www.ibm.com/docs/en/cognos-analytics/12.0.0?topic=forecasting-statistical-details</a:t>
+            </a:r>
+            <a:endParaRPr lang="en-IE" sz="1600" kern="100" dirty="0">
+              <a:effectLst/>
+              <a:latin typeface="+mn-lt"/>
+              <a:ea typeface="Aptos" panose="020B0004020202020204" pitchFamily="34" charset="0"/>
+              <a:cs typeface="Latha" panose="020B0604020202020204" pitchFamily="34" charset="0"/>
+            </a:endParaRPr>
           </a:p>
         </p:txBody>
       </p:sp>

</xml_diff>